<commit_message>
Cleaned up script and Rmd files
</commit_message>
<xml_diff>
--- a/docs/RMD-Presentation.pptx
+++ b/docs/RMD-Presentation.pptx
@@ -162,7 +162,7 @@
 <file path=ppt/revisionInfo.xml><?xml version="1.0" encoding="utf-8"?>
 <p1510:revInfo xmlns:a="http://schemas.openxmlformats.org/drawingml/2006/main" xmlns:r="http://schemas.openxmlformats.org/officeDocument/2006/relationships" xmlns:p1510="http://schemas.microsoft.com/office/powerpoint/2015/10/main">
   <p1510:revLst>
-    <p1510:client id="{9D51384A-06A3-4410-8BBF-4FD5D23211D3}" v="31" dt="2020-03-30T14:30:00.324"/>
+    <p1510:client id="{9D51384A-06A3-4410-8BBF-4FD5D23211D3}" v="34" dt="2020-03-30T14:44:25.193"/>
   </p1510:revLst>
 </p1510:revInfo>
 </file>
@@ -172,7 +172,7 @@
   <pc:docChgLst>
     <pc:chgData name="Belinsky, Charles" userId="df390934-7dca-40c8-90db-c8d8d67e4ef2" providerId="ADAL" clId="{9D51384A-06A3-4410-8BBF-4FD5D23211D3}"/>
     <pc:docChg chg="undo custSel addSld modSld modMainMaster modShowInfo">
-      <pc:chgData name="Belinsky, Charles" userId="df390934-7dca-40c8-90db-c8d8d67e4ef2" providerId="ADAL" clId="{9D51384A-06A3-4410-8BBF-4FD5D23211D3}" dt="2020-03-30T14:31:27.832" v="3795" actId="20577"/>
+      <pc:chgData name="Belinsky, Charles" userId="df390934-7dca-40c8-90db-c8d8d67e4ef2" providerId="ADAL" clId="{9D51384A-06A3-4410-8BBF-4FD5D23211D3}" dt="2020-03-30T14:44:25.711" v="3797" actId="255"/>
       <pc:docMkLst>
         <pc:docMk/>
       </pc:docMkLst>
@@ -474,7 +474,7 @@
         </pc:spChg>
       </pc:sldChg>
       <pc:sldChg chg="modSp mod modNotesTx">
-        <pc:chgData name="Belinsky, Charles" userId="df390934-7dca-40c8-90db-c8d8d67e4ef2" providerId="ADAL" clId="{9D51384A-06A3-4410-8BBF-4FD5D23211D3}" dt="2020-03-30T12:50:24.894" v="631" actId="6549"/>
+        <pc:chgData name="Belinsky, Charles" userId="df390934-7dca-40c8-90db-c8d8d67e4ef2" providerId="ADAL" clId="{9D51384A-06A3-4410-8BBF-4FD5D23211D3}" dt="2020-03-30T14:44:25.711" v="3797" actId="255"/>
         <pc:sldMkLst>
           <pc:docMk/>
           <pc:sldMk cId="3336794585" sldId="299"/>
@@ -493,6 +493,14 @@
             <pc:docMk/>
             <pc:sldMk cId="3336794585" sldId="299"/>
             <ac:spMk id="3" creationId="{2B9EAD0A-1846-4726-B035-D80FCE534E6D}"/>
+          </ac:spMkLst>
+        </pc:spChg>
+        <pc:spChg chg="mod">
+          <ac:chgData name="Belinsky, Charles" userId="df390934-7dca-40c8-90db-c8d8d67e4ef2" providerId="ADAL" clId="{9D51384A-06A3-4410-8BBF-4FD5D23211D3}" dt="2020-03-30T14:44:25.711" v="3797" actId="255"/>
+          <ac:spMkLst>
+            <pc:docMk/>
+            <pc:sldMk cId="3336794585" sldId="299"/>
+            <ac:spMk id="4" creationId="{E0E3FBFD-874C-437C-BACC-2EBA3469E83F}"/>
           </ac:spMkLst>
         </pc:spChg>
       </pc:sldChg>
@@ -3879,8 +3887,8 @@
           <a:bodyPr/>
           <a:lstStyle/>
           <a:p>
-            <a:fld id="{F0DFD029-FB74-4578-B929-F66AA97659CA}" type="datetimeFigureOut">
-              <a:rPr lang="en-US"/>
+            <a:fld id="{2ED05E8C-A888-4B07-A52A-D355596E82B5}" type="datetime1">
+              <a:rPr lang="en-US" smtClean="0"/>
               <a:t>3/30/2020</a:t>
             </a:fld>
             <a:endParaRPr/>
@@ -4077,8 +4085,8 @@
           <a:bodyPr/>
           <a:lstStyle/>
           <a:p>
-            <a:fld id="{F0DFD029-FB74-4578-B929-F66AA97659CA}" type="datetimeFigureOut">
-              <a:rPr lang="en-US"/>
+            <a:fld id="{93208A45-5D82-4263-BAC1-90A5E4B8043F}" type="datetime1">
+              <a:rPr lang="en-US" smtClean="0"/>
               <a:t>3/30/2020</a:t>
             </a:fld>
             <a:endParaRPr/>
@@ -4285,8 +4293,8 @@
           <a:bodyPr/>
           <a:lstStyle/>
           <a:p>
-            <a:fld id="{F0DFD029-FB74-4578-B929-F66AA97659CA}" type="datetimeFigureOut">
-              <a:rPr lang="en-US"/>
+            <a:fld id="{C77AC33A-291A-4887-B8B0-CC157FD3E9D2}" type="datetime1">
+              <a:rPr lang="en-US" smtClean="0"/>
               <a:t>3/30/2020</a:t>
             </a:fld>
             <a:endParaRPr/>
@@ -4483,8 +4491,8 @@
           <a:bodyPr/>
           <a:lstStyle/>
           <a:p>
-            <a:fld id="{F0DFD029-FB74-4578-B929-F66AA97659CA}" type="datetimeFigureOut">
-              <a:rPr lang="en-US"/>
+            <a:fld id="{B9EEDF3F-6603-4D80-AEDF-072A080572A0}" type="datetime1">
+              <a:rPr lang="en-US" smtClean="0"/>
               <a:t>3/30/2020</a:t>
             </a:fld>
             <a:endParaRPr/>
@@ -4915,8 +4923,8 @@
           <a:bodyPr/>
           <a:lstStyle/>
           <a:p>
-            <a:fld id="{F0DFD029-FB74-4578-B929-F66AA97659CA}" type="datetimeFigureOut">
-              <a:rPr lang="en-US"/>
+            <a:fld id="{CAB70B77-1600-455C-A7E8-E70AD9633843}" type="datetime1">
+              <a:rPr lang="en-US" smtClean="0"/>
               <a:t>3/30/2020</a:t>
             </a:fld>
             <a:endParaRPr/>
@@ -5219,8 +5227,8 @@
           <a:bodyPr/>
           <a:lstStyle/>
           <a:p>
-            <a:fld id="{F0DFD029-FB74-4578-B929-F66AA97659CA}" type="datetimeFigureOut">
-              <a:rPr lang="en-US"/>
+            <a:fld id="{5E429030-9D55-44EB-B964-F04539320881}" type="datetime1">
+              <a:rPr lang="en-US" smtClean="0"/>
               <a:t>3/30/2020</a:t>
             </a:fld>
             <a:endParaRPr/>
@@ -5675,8 +5683,8 @@
           <a:bodyPr/>
           <a:lstStyle/>
           <a:p>
-            <a:fld id="{F0DFD029-FB74-4578-B929-F66AA97659CA}" type="datetimeFigureOut">
-              <a:rPr lang="en-US"/>
+            <a:fld id="{0B3E004E-4E7A-4180-8150-58BFC4B56350}" type="datetime1">
+              <a:rPr lang="en-US" smtClean="0"/>
               <a:t>3/30/2020</a:t>
             </a:fld>
             <a:endParaRPr/>
@@ -5805,8 +5813,8 @@
           <a:bodyPr/>
           <a:lstStyle/>
           <a:p>
-            <a:fld id="{F0DFD029-FB74-4578-B929-F66AA97659CA}" type="datetimeFigureOut">
-              <a:rPr lang="en-US"/>
+            <a:fld id="{684268D1-A27E-48BA-A36D-83EAE2450713}" type="datetime1">
+              <a:rPr lang="en-US" smtClean="0"/>
               <a:t>3/30/2020</a:t>
             </a:fld>
             <a:endParaRPr/>
@@ -5912,8 +5920,8 @@
           <a:bodyPr/>
           <a:lstStyle/>
           <a:p>
-            <a:fld id="{F0DFD029-FB74-4578-B929-F66AA97659CA}" type="datetimeFigureOut">
-              <a:rPr lang="en-US"/>
+            <a:fld id="{AEB78C44-6B62-496F-A731-44BC3334C425}" type="datetime1">
+              <a:rPr lang="en-US" smtClean="0"/>
               <a:t>3/30/2020</a:t>
             </a:fld>
             <a:endParaRPr/>
@@ -6211,8 +6219,8 @@
           <a:bodyPr/>
           <a:lstStyle/>
           <a:p>
-            <a:fld id="{F0DFD029-FB74-4578-B929-F66AA97659CA}" type="datetimeFigureOut">
-              <a:rPr lang="en-US"/>
+            <a:fld id="{08914BDC-57A0-4904-80FF-B8C2932E3255}" type="datetime1">
+              <a:rPr lang="en-US" smtClean="0"/>
               <a:t>3/30/2020</a:t>
             </a:fld>
             <a:endParaRPr/>
@@ -6499,8 +6507,8 @@
           <a:bodyPr/>
           <a:lstStyle/>
           <a:p>
-            <a:fld id="{F0DFD029-FB74-4578-B929-F66AA97659CA}" type="datetimeFigureOut">
-              <a:rPr lang="en-US"/>
+            <a:fld id="{9E5FD6F6-B44B-406E-8E30-170845AF9474}" type="datetime1">
+              <a:rPr lang="en-US" smtClean="0"/>
               <a:t>3/30/2020</a:t>
             </a:fld>
             <a:endParaRPr/>
@@ -7121,9 +7129,8 @@
             </a:lvl1pPr>
           </a:lstStyle>
           <a:p>
-            <a:fld id="{F0DFD029-FB74-4578-B929-F66AA97659CA}" type="datetimeFigureOut">
-              <a:rPr lang="en-US"/>
-              <a:pPr/>
+            <a:fld id="{FEE77949-F962-457A-B286-9888169BA74B}" type="datetime1">
+              <a:rPr lang="en-US" smtClean="0"/>
               <a:t>3/30/2020</a:t>
             </a:fld>
             <a:endParaRPr/>
@@ -7242,6 +7249,7 @@
       </p:transition>
     </mc:Fallback>
   </mc:AlternateContent>
+  <p:hf hdr="0" ftr="0" dt="0"/>
   <p:txStyles>
     <p:titleStyle>
       <a:lvl1pPr algn="l" defTabSz="1219007" rtl="0" eaLnBrk="1" latinLnBrk="0" hangingPunct="1">
@@ -7698,6 +7706,35 @@
           </a:p>
         </p:txBody>
       </p:sp>
+      <p:sp>
+        <p:nvSpPr>
+          <p:cNvPr id="4" name="Slide Number Placeholder 3">
+            <a:extLst>
+              <a:ext uri="{FF2B5EF4-FFF2-40B4-BE49-F238E27FC236}">
+                <a16:creationId xmlns:a16="http://schemas.microsoft.com/office/drawing/2014/main" id="{E0E3FBFD-874C-437C-BACC-2EBA3469E83F}"/>
+              </a:ext>
+            </a:extLst>
+          </p:cNvPr>
+          <p:cNvSpPr>
+            <a:spLocks noGrp="1"/>
+          </p:cNvSpPr>
+          <p:nvPr>
+            <p:ph type="sldNum" sz="quarter" idx="12"/>
+          </p:nvPr>
+        </p:nvSpPr>
+        <p:spPr/>
+        <p:txBody>
+          <a:bodyPr/>
+          <a:lstStyle/>
+          <a:p>
+            <a:fld id="{C014DD1E-5D91-48A3-AD6D-45FBA980D106}" type="slidenum">
+              <a:rPr lang="en-US" smtClean="0"/>
+              <a:t>1</a:t>
+            </a:fld>
+            <a:endParaRPr lang="en-US" dirty="0"/>
+          </a:p>
+        </p:txBody>
+      </p:sp>
     </p:spTree>
     <p:extLst>
       <p:ext uri="{BB962C8B-B14F-4D97-AF65-F5344CB8AC3E}">
@@ -7880,6 +7917,35 @@
           </a:p>
         </p:txBody>
       </p:sp>
+      <p:sp>
+        <p:nvSpPr>
+          <p:cNvPr id="2" name="Slide Number Placeholder 1">
+            <a:extLst>
+              <a:ext uri="{FF2B5EF4-FFF2-40B4-BE49-F238E27FC236}">
+                <a16:creationId xmlns:a16="http://schemas.microsoft.com/office/drawing/2014/main" id="{7BCE6EE7-3C53-41F9-BAEB-58565989AD5E}"/>
+              </a:ext>
+            </a:extLst>
+          </p:cNvPr>
+          <p:cNvSpPr>
+            <a:spLocks noGrp="1"/>
+          </p:cNvSpPr>
+          <p:nvPr>
+            <p:ph type="sldNum" sz="quarter" idx="12"/>
+          </p:nvPr>
+        </p:nvSpPr>
+        <p:spPr/>
+        <p:txBody>
+          <a:bodyPr/>
+          <a:lstStyle/>
+          <a:p>
+            <a:fld id="{C014DD1E-5D91-48A3-AD6D-45FBA980D106}" type="slidenum">
+              <a:rPr lang="en-US" smtClean="0"/>
+              <a:t>10</a:t>
+            </a:fld>
+            <a:endParaRPr lang="en-US"/>
+          </a:p>
+        </p:txBody>
+      </p:sp>
     </p:spTree>
     <p:extLst>
       <p:ext uri="{BB962C8B-B14F-4D97-AF65-F5344CB8AC3E}">
@@ -8039,6 +8105,35 @@
           </a:p>
         </p:txBody>
       </p:sp>
+      <p:sp>
+        <p:nvSpPr>
+          <p:cNvPr id="2" name="Slide Number Placeholder 1">
+            <a:extLst>
+              <a:ext uri="{FF2B5EF4-FFF2-40B4-BE49-F238E27FC236}">
+                <a16:creationId xmlns:a16="http://schemas.microsoft.com/office/drawing/2014/main" id="{34D7CE56-48A3-45C6-A4DD-8DBF909CE23C}"/>
+              </a:ext>
+            </a:extLst>
+          </p:cNvPr>
+          <p:cNvSpPr>
+            <a:spLocks noGrp="1"/>
+          </p:cNvSpPr>
+          <p:nvPr>
+            <p:ph type="sldNum" sz="quarter" idx="12"/>
+          </p:nvPr>
+        </p:nvSpPr>
+        <p:spPr/>
+        <p:txBody>
+          <a:bodyPr/>
+          <a:lstStyle/>
+          <a:p>
+            <a:fld id="{C014DD1E-5D91-48A3-AD6D-45FBA980D106}" type="slidenum">
+              <a:rPr lang="en-US" smtClean="0"/>
+              <a:t>11</a:t>
+            </a:fld>
+            <a:endParaRPr lang="en-US"/>
+          </a:p>
+        </p:txBody>
+      </p:sp>
     </p:spTree>
     <p:extLst>
       <p:ext uri="{BB962C8B-B14F-4D97-AF65-F5344CB8AC3E}">
@@ -8156,6 +8251,35 @@
           </a:p>
         </p:txBody>
       </p:sp>
+      <p:sp>
+        <p:nvSpPr>
+          <p:cNvPr id="2" name="Slide Number Placeholder 1">
+            <a:extLst>
+              <a:ext uri="{FF2B5EF4-FFF2-40B4-BE49-F238E27FC236}">
+                <a16:creationId xmlns:a16="http://schemas.microsoft.com/office/drawing/2014/main" id="{A6AE8A7F-EE51-4093-A23E-DBB1BBCE5EDA}"/>
+              </a:ext>
+            </a:extLst>
+          </p:cNvPr>
+          <p:cNvSpPr>
+            <a:spLocks noGrp="1"/>
+          </p:cNvSpPr>
+          <p:nvPr>
+            <p:ph type="sldNum" sz="quarter" idx="12"/>
+          </p:nvPr>
+        </p:nvSpPr>
+        <p:spPr/>
+        <p:txBody>
+          <a:bodyPr/>
+          <a:lstStyle/>
+          <a:p>
+            <a:fld id="{C014DD1E-5D91-48A3-AD6D-45FBA980D106}" type="slidenum">
+              <a:rPr lang="en-US" smtClean="0"/>
+              <a:t>12</a:t>
+            </a:fld>
+            <a:endParaRPr lang="en-US"/>
+          </a:p>
+        </p:txBody>
+      </p:sp>
     </p:spTree>
     <p:extLst>
       <p:ext uri="{BB962C8B-B14F-4D97-AF65-F5344CB8AC3E}">
@@ -8365,6 +8489,35 @@
           </a:p>
         </p:txBody>
       </p:sp>
+      <p:sp>
+        <p:nvSpPr>
+          <p:cNvPr id="2" name="Slide Number Placeholder 1">
+            <a:extLst>
+              <a:ext uri="{FF2B5EF4-FFF2-40B4-BE49-F238E27FC236}">
+                <a16:creationId xmlns:a16="http://schemas.microsoft.com/office/drawing/2014/main" id="{BB5DC84F-A4EC-499C-98B2-B0823A73C248}"/>
+              </a:ext>
+            </a:extLst>
+          </p:cNvPr>
+          <p:cNvSpPr>
+            <a:spLocks noGrp="1"/>
+          </p:cNvSpPr>
+          <p:nvPr>
+            <p:ph type="sldNum" sz="quarter" idx="12"/>
+          </p:nvPr>
+        </p:nvSpPr>
+        <p:spPr/>
+        <p:txBody>
+          <a:bodyPr/>
+          <a:lstStyle/>
+          <a:p>
+            <a:fld id="{C014DD1E-5D91-48A3-AD6D-45FBA980D106}" type="slidenum">
+              <a:rPr lang="en-US" smtClean="0"/>
+              <a:t>13</a:t>
+            </a:fld>
+            <a:endParaRPr lang="en-US"/>
+          </a:p>
+        </p:txBody>
+      </p:sp>
     </p:spTree>
     <p:extLst>
       <p:ext uri="{BB962C8B-B14F-4D97-AF65-F5344CB8AC3E}">
@@ -8508,6 +8661,35 @@
           </a:p>
         </p:txBody>
       </p:sp>
+      <p:sp>
+        <p:nvSpPr>
+          <p:cNvPr id="2" name="Slide Number Placeholder 1">
+            <a:extLst>
+              <a:ext uri="{FF2B5EF4-FFF2-40B4-BE49-F238E27FC236}">
+                <a16:creationId xmlns:a16="http://schemas.microsoft.com/office/drawing/2014/main" id="{49388FF5-5A81-4010-835E-2D8234AC2B6B}"/>
+              </a:ext>
+            </a:extLst>
+          </p:cNvPr>
+          <p:cNvSpPr>
+            <a:spLocks noGrp="1"/>
+          </p:cNvSpPr>
+          <p:nvPr>
+            <p:ph type="sldNum" sz="quarter" idx="12"/>
+          </p:nvPr>
+        </p:nvSpPr>
+        <p:spPr/>
+        <p:txBody>
+          <a:bodyPr/>
+          <a:lstStyle/>
+          <a:p>
+            <a:fld id="{C014DD1E-5D91-48A3-AD6D-45FBA980D106}" type="slidenum">
+              <a:rPr lang="en-US" smtClean="0"/>
+              <a:t>14</a:t>
+            </a:fld>
+            <a:endParaRPr lang="en-US"/>
+          </a:p>
+        </p:txBody>
+      </p:sp>
     </p:spTree>
     <p:extLst>
       <p:ext uri="{BB962C8B-B14F-4D97-AF65-F5344CB8AC3E}">
@@ -8658,6 +8840,35 @@
           </a:p>
         </p:txBody>
       </p:sp>
+      <p:sp>
+        <p:nvSpPr>
+          <p:cNvPr id="2" name="Slide Number Placeholder 1">
+            <a:extLst>
+              <a:ext uri="{FF2B5EF4-FFF2-40B4-BE49-F238E27FC236}">
+                <a16:creationId xmlns:a16="http://schemas.microsoft.com/office/drawing/2014/main" id="{CEBFE931-8520-4B1B-8ADC-0854B151CFB7}"/>
+              </a:ext>
+            </a:extLst>
+          </p:cNvPr>
+          <p:cNvSpPr>
+            <a:spLocks noGrp="1"/>
+          </p:cNvSpPr>
+          <p:nvPr>
+            <p:ph type="sldNum" sz="quarter" idx="12"/>
+          </p:nvPr>
+        </p:nvSpPr>
+        <p:spPr/>
+        <p:txBody>
+          <a:bodyPr/>
+          <a:lstStyle/>
+          <a:p>
+            <a:fld id="{C014DD1E-5D91-48A3-AD6D-45FBA980D106}" type="slidenum">
+              <a:rPr lang="en-US" smtClean="0"/>
+              <a:t>15</a:t>
+            </a:fld>
+            <a:endParaRPr lang="en-US"/>
+          </a:p>
+        </p:txBody>
+      </p:sp>
     </p:spTree>
     <p:extLst>
       <p:ext uri="{BB962C8B-B14F-4D97-AF65-F5344CB8AC3E}">
@@ -8810,6 +9021,35 @@
           </a:p>
         </p:txBody>
       </p:sp>
+      <p:sp>
+        <p:nvSpPr>
+          <p:cNvPr id="2" name="Slide Number Placeholder 1">
+            <a:extLst>
+              <a:ext uri="{FF2B5EF4-FFF2-40B4-BE49-F238E27FC236}">
+                <a16:creationId xmlns:a16="http://schemas.microsoft.com/office/drawing/2014/main" id="{B59790B5-6EC5-400E-B596-5D9D34337790}"/>
+              </a:ext>
+            </a:extLst>
+          </p:cNvPr>
+          <p:cNvSpPr>
+            <a:spLocks noGrp="1"/>
+          </p:cNvSpPr>
+          <p:nvPr>
+            <p:ph type="sldNum" sz="quarter" idx="12"/>
+          </p:nvPr>
+        </p:nvSpPr>
+        <p:spPr/>
+        <p:txBody>
+          <a:bodyPr/>
+          <a:lstStyle/>
+          <a:p>
+            <a:fld id="{C014DD1E-5D91-48A3-AD6D-45FBA980D106}" type="slidenum">
+              <a:rPr lang="en-US" smtClean="0"/>
+              <a:t>16</a:t>
+            </a:fld>
+            <a:endParaRPr lang="en-US"/>
+          </a:p>
+        </p:txBody>
+      </p:sp>
     </p:spTree>
     <p:extLst>
       <p:ext uri="{BB962C8B-B14F-4D97-AF65-F5344CB8AC3E}">
@@ -8950,6 +9190,35 @@
           </a:p>
         </p:txBody>
       </p:sp>
+      <p:sp>
+        <p:nvSpPr>
+          <p:cNvPr id="2" name="Slide Number Placeholder 1">
+            <a:extLst>
+              <a:ext uri="{FF2B5EF4-FFF2-40B4-BE49-F238E27FC236}">
+                <a16:creationId xmlns:a16="http://schemas.microsoft.com/office/drawing/2014/main" id="{D40C3823-2AC8-410D-8454-238D8F554927}"/>
+              </a:ext>
+            </a:extLst>
+          </p:cNvPr>
+          <p:cNvSpPr>
+            <a:spLocks noGrp="1"/>
+          </p:cNvSpPr>
+          <p:nvPr>
+            <p:ph type="sldNum" sz="quarter" idx="12"/>
+          </p:nvPr>
+        </p:nvSpPr>
+        <p:spPr/>
+        <p:txBody>
+          <a:bodyPr/>
+          <a:lstStyle/>
+          <a:p>
+            <a:fld id="{C014DD1E-5D91-48A3-AD6D-45FBA980D106}" type="slidenum">
+              <a:rPr lang="en-US" smtClean="0"/>
+              <a:t>17</a:t>
+            </a:fld>
+            <a:endParaRPr lang="en-US"/>
+          </a:p>
+        </p:txBody>
+      </p:sp>
     </p:spTree>
     <p:extLst>
       <p:ext uri="{BB962C8B-B14F-4D97-AF65-F5344CB8AC3E}">
@@ -9139,6 +9408,35 @@
           </a:p>
         </p:txBody>
       </p:sp>
+      <p:sp>
+        <p:nvSpPr>
+          <p:cNvPr id="4" name="Slide Number Placeholder 3">
+            <a:extLst>
+              <a:ext uri="{FF2B5EF4-FFF2-40B4-BE49-F238E27FC236}">
+                <a16:creationId xmlns:a16="http://schemas.microsoft.com/office/drawing/2014/main" id="{EC19E349-8D01-4681-8102-F4FCFB3944E3}"/>
+              </a:ext>
+            </a:extLst>
+          </p:cNvPr>
+          <p:cNvSpPr>
+            <a:spLocks noGrp="1"/>
+          </p:cNvSpPr>
+          <p:nvPr>
+            <p:ph type="sldNum" sz="quarter" idx="12"/>
+          </p:nvPr>
+        </p:nvSpPr>
+        <p:spPr/>
+        <p:txBody>
+          <a:bodyPr/>
+          <a:lstStyle/>
+          <a:p>
+            <a:fld id="{C014DD1E-5D91-48A3-AD6D-45FBA980D106}" type="slidenum">
+              <a:rPr lang="en-US" smtClean="0"/>
+              <a:t>2</a:t>
+            </a:fld>
+            <a:endParaRPr lang="en-US"/>
+          </a:p>
+        </p:txBody>
+      </p:sp>
     </p:spTree>
     <p:extLst>
       <p:ext uri="{BB962C8B-B14F-4D97-AF65-F5344CB8AC3E}">
@@ -9384,6 +9682,35 @@
           </a:p>
         </p:txBody>
       </p:sp>
+      <p:sp>
+        <p:nvSpPr>
+          <p:cNvPr id="4" name="Slide Number Placeholder 3">
+            <a:extLst>
+              <a:ext uri="{FF2B5EF4-FFF2-40B4-BE49-F238E27FC236}">
+                <a16:creationId xmlns:a16="http://schemas.microsoft.com/office/drawing/2014/main" id="{1A2D4BC4-5FB2-4034-A1E7-1B022EF74D19}"/>
+              </a:ext>
+            </a:extLst>
+          </p:cNvPr>
+          <p:cNvSpPr>
+            <a:spLocks noGrp="1"/>
+          </p:cNvSpPr>
+          <p:nvPr>
+            <p:ph type="sldNum" sz="quarter" idx="12"/>
+          </p:nvPr>
+        </p:nvSpPr>
+        <p:spPr/>
+        <p:txBody>
+          <a:bodyPr/>
+          <a:lstStyle/>
+          <a:p>
+            <a:fld id="{C014DD1E-5D91-48A3-AD6D-45FBA980D106}" type="slidenum">
+              <a:rPr lang="en-US" smtClean="0"/>
+              <a:t>3</a:t>
+            </a:fld>
+            <a:endParaRPr lang="en-US"/>
+          </a:p>
+        </p:txBody>
+      </p:sp>
     </p:spTree>
     <p:extLst>
       <p:ext uri="{BB962C8B-B14F-4D97-AF65-F5344CB8AC3E}">
@@ -9539,6 +9866,35 @@
           </a:p>
         </p:txBody>
       </p:sp>
+      <p:sp>
+        <p:nvSpPr>
+          <p:cNvPr id="2" name="Slide Number Placeholder 1">
+            <a:extLst>
+              <a:ext uri="{FF2B5EF4-FFF2-40B4-BE49-F238E27FC236}">
+                <a16:creationId xmlns:a16="http://schemas.microsoft.com/office/drawing/2014/main" id="{377372E3-9DBF-4946-A399-5CA35EBED8EF}"/>
+              </a:ext>
+            </a:extLst>
+          </p:cNvPr>
+          <p:cNvSpPr>
+            <a:spLocks noGrp="1"/>
+          </p:cNvSpPr>
+          <p:nvPr>
+            <p:ph type="sldNum" sz="quarter" idx="12"/>
+          </p:nvPr>
+        </p:nvSpPr>
+        <p:spPr/>
+        <p:txBody>
+          <a:bodyPr/>
+          <a:lstStyle/>
+          <a:p>
+            <a:fld id="{C014DD1E-5D91-48A3-AD6D-45FBA980D106}" type="slidenum">
+              <a:rPr lang="en-US" smtClean="0"/>
+              <a:t>4</a:t>
+            </a:fld>
+            <a:endParaRPr lang="en-US"/>
+          </a:p>
+        </p:txBody>
+      </p:sp>
     </p:spTree>
     <p:extLst>
       <p:ext uri="{BB962C8B-B14F-4D97-AF65-F5344CB8AC3E}">
@@ -9695,6 +10051,35 @@
           </a:p>
         </p:txBody>
       </p:sp>
+      <p:sp>
+        <p:nvSpPr>
+          <p:cNvPr id="2" name="Slide Number Placeholder 1">
+            <a:extLst>
+              <a:ext uri="{FF2B5EF4-FFF2-40B4-BE49-F238E27FC236}">
+                <a16:creationId xmlns:a16="http://schemas.microsoft.com/office/drawing/2014/main" id="{1720EF59-5CC1-4F4E-ABDE-850CF03DBFA0}"/>
+              </a:ext>
+            </a:extLst>
+          </p:cNvPr>
+          <p:cNvSpPr>
+            <a:spLocks noGrp="1"/>
+          </p:cNvSpPr>
+          <p:nvPr>
+            <p:ph type="sldNum" sz="quarter" idx="12"/>
+          </p:nvPr>
+        </p:nvSpPr>
+        <p:spPr/>
+        <p:txBody>
+          <a:bodyPr/>
+          <a:lstStyle/>
+          <a:p>
+            <a:fld id="{C014DD1E-5D91-48A3-AD6D-45FBA980D106}" type="slidenum">
+              <a:rPr lang="en-US" smtClean="0"/>
+              <a:t>5</a:t>
+            </a:fld>
+            <a:endParaRPr lang="en-US"/>
+          </a:p>
+        </p:txBody>
+      </p:sp>
     </p:spTree>
     <p:extLst>
       <p:ext uri="{BB962C8B-B14F-4D97-AF65-F5344CB8AC3E}">
@@ -9906,6 +10291,35 @@
           </a:p>
         </p:txBody>
       </p:sp>
+      <p:sp>
+        <p:nvSpPr>
+          <p:cNvPr id="2" name="Slide Number Placeholder 1">
+            <a:extLst>
+              <a:ext uri="{FF2B5EF4-FFF2-40B4-BE49-F238E27FC236}">
+                <a16:creationId xmlns:a16="http://schemas.microsoft.com/office/drawing/2014/main" id="{3383F633-7379-43DE-8E90-0B5045EE71E3}"/>
+              </a:ext>
+            </a:extLst>
+          </p:cNvPr>
+          <p:cNvSpPr>
+            <a:spLocks noGrp="1"/>
+          </p:cNvSpPr>
+          <p:nvPr>
+            <p:ph type="sldNum" sz="quarter" idx="12"/>
+          </p:nvPr>
+        </p:nvSpPr>
+        <p:spPr/>
+        <p:txBody>
+          <a:bodyPr/>
+          <a:lstStyle/>
+          <a:p>
+            <a:fld id="{C014DD1E-5D91-48A3-AD6D-45FBA980D106}" type="slidenum">
+              <a:rPr lang="en-US" smtClean="0"/>
+              <a:t>6</a:t>
+            </a:fld>
+            <a:endParaRPr lang="en-US"/>
+          </a:p>
+        </p:txBody>
+      </p:sp>
     </p:spTree>
     <p:extLst>
       <p:ext uri="{BB962C8B-B14F-4D97-AF65-F5344CB8AC3E}">
@@ -10072,6 +10486,35 @@
           </a:p>
         </p:txBody>
       </p:sp>
+      <p:sp>
+        <p:nvSpPr>
+          <p:cNvPr id="2" name="Slide Number Placeholder 1">
+            <a:extLst>
+              <a:ext uri="{FF2B5EF4-FFF2-40B4-BE49-F238E27FC236}">
+                <a16:creationId xmlns:a16="http://schemas.microsoft.com/office/drawing/2014/main" id="{2FD61248-24A2-4617-AF31-914427AA60EB}"/>
+              </a:ext>
+            </a:extLst>
+          </p:cNvPr>
+          <p:cNvSpPr>
+            <a:spLocks noGrp="1"/>
+          </p:cNvSpPr>
+          <p:nvPr>
+            <p:ph type="sldNum" sz="quarter" idx="12"/>
+          </p:nvPr>
+        </p:nvSpPr>
+        <p:spPr/>
+        <p:txBody>
+          <a:bodyPr/>
+          <a:lstStyle/>
+          <a:p>
+            <a:fld id="{C014DD1E-5D91-48A3-AD6D-45FBA980D106}" type="slidenum">
+              <a:rPr lang="en-US" smtClean="0"/>
+              <a:t>7</a:t>
+            </a:fld>
+            <a:endParaRPr lang="en-US"/>
+          </a:p>
+        </p:txBody>
+      </p:sp>
     </p:spTree>
     <p:extLst>
       <p:ext uri="{BB962C8B-B14F-4D97-AF65-F5344CB8AC3E}">
@@ -10224,6 +10667,35 @@
           </a:p>
         </p:txBody>
       </p:sp>
+      <p:sp>
+        <p:nvSpPr>
+          <p:cNvPr id="2" name="Slide Number Placeholder 1">
+            <a:extLst>
+              <a:ext uri="{FF2B5EF4-FFF2-40B4-BE49-F238E27FC236}">
+                <a16:creationId xmlns:a16="http://schemas.microsoft.com/office/drawing/2014/main" id="{CA6B3F5C-E9CD-4F7C-97C8-FFD9C9BDE5FB}"/>
+              </a:ext>
+            </a:extLst>
+          </p:cNvPr>
+          <p:cNvSpPr>
+            <a:spLocks noGrp="1"/>
+          </p:cNvSpPr>
+          <p:nvPr>
+            <p:ph type="sldNum" sz="quarter" idx="12"/>
+          </p:nvPr>
+        </p:nvSpPr>
+        <p:spPr/>
+        <p:txBody>
+          <a:bodyPr/>
+          <a:lstStyle/>
+          <a:p>
+            <a:fld id="{C014DD1E-5D91-48A3-AD6D-45FBA980D106}" type="slidenum">
+              <a:rPr lang="en-US" smtClean="0"/>
+              <a:t>8</a:t>
+            </a:fld>
+            <a:endParaRPr lang="en-US"/>
+          </a:p>
+        </p:txBody>
+      </p:sp>
     </p:spTree>
     <p:extLst>
       <p:ext uri="{BB962C8B-B14F-4D97-AF65-F5344CB8AC3E}">
@@ -10388,6 +10860,35 @@
               </a:rPr>
               <a:t>) documents</a:t>
             </a:r>
+          </a:p>
+        </p:txBody>
+      </p:sp>
+      <p:sp>
+        <p:nvSpPr>
+          <p:cNvPr id="2" name="Slide Number Placeholder 1">
+            <a:extLst>
+              <a:ext uri="{FF2B5EF4-FFF2-40B4-BE49-F238E27FC236}">
+                <a16:creationId xmlns:a16="http://schemas.microsoft.com/office/drawing/2014/main" id="{8D0138D5-1C5A-4C5D-B4EF-6843E375B337}"/>
+              </a:ext>
+            </a:extLst>
+          </p:cNvPr>
+          <p:cNvSpPr>
+            <a:spLocks noGrp="1"/>
+          </p:cNvSpPr>
+          <p:nvPr>
+            <p:ph type="sldNum" sz="quarter" idx="12"/>
+          </p:nvPr>
+        </p:nvSpPr>
+        <p:spPr/>
+        <p:txBody>
+          <a:bodyPr/>
+          <a:lstStyle/>
+          <a:p>
+            <a:fld id="{C014DD1E-5D91-48A3-AD6D-45FBA980D106}" type="slidenum">
+              <a:rPr lang="en-US" smtClean="0"/>
+              <a:t>9</a:t>
+            </a:fld>
+            <a:endParaRPr lang="en-US"/>
           </a:p>
         </p:txBody>
       </p:sp>
@@ -11367,6 +11868,15 @@
 </file>
 
 <file path=customXml/item1.xml><?xml version="1.0" encoding="utf-8"?>
+<?mso-contentType ?>
+<FormTemplates xmlns="http://schemas.microsoft.com/sharepoint/v3/contenttype/forms">
+  <Display>DocumentLibraryForm</Display>
+  <Edit>DocumentLibraryForm</Edit>
+  <New>DocumentLibraryForm</New>
+</FormTemplates>
+</file>
+
+<file path=customXml/item2.xml><?xml version="1.0" encoding="utf-8"?>
 <ct:contentTypeSchema xmlns:ct="http://schemas.microsoft.com/office/2006/metadata/contentType" xmlns:ma="http://schemas.microsoft.com/office/2006/metadata/properties/metaAttributes" ct:_="" ma:_="" ma:contentTypeName="Document" ma:contentTypeID="0x0101003DB5B97B54300B4889C1AC7361F68213" ma:contentTypeVersion="14" ma:contentTypeDescription="Create a new document." ma:contentTypeScope="" ma:versionID="b3a4fb828f3a04ce1ee1646d58eb04a7">
   <xsd:schema xmlns:xsd="http://www.w3.org/2001/XMLSchema" xmlns:xs="http://www.w3.org/2001/XMLSchema" xmlns:p="http://schemas.microsoft.com/office/2006/metadata/properties" xmlns:ns1="http://schemas.microsoft.com/sharepoint/v3" xmlns:ns2="0b3136f0-a1b3-4de4-aaf6-47b51dbb702c" xmlns:ns3="3076eba4-c0ca-4bad-b773-16a3112e7607" targetNamespace="http://schemas.microsoft.com/office/2006/metadata/properties" ma:root="true" ma:fieldsID="fc7abf6f59e632741c2abb53f83e984a" ns1:_="" ns2:_="" ns3:_="">
     <xsd:import namespace="http://schemas.microsoft.com/sharepoint/v3"/>
@@ -11600,15 +12110,6 @@
 </ct:contentTypeSchema>
 </file>
 
-<file path=customXml/item2.xml><?xml version="1.0" encoding="utf-8"?>
-<?mso-contentType ?>
-<FormTemplates xmlns="http://schemas.microsoft.com/sharepoint/v3/contenttype/forms">
-  <Display>DocumentLibraryForm</Display>
-  <Edit>DocumentLibraryForm</Edit>
-  <New>DocumentLibraryForm</New>
-</FormTemplates>
-</file>
-
 <file path=customXml/item3.xml><?xml version="1.0" encoding="utf-8"?>
 <p:properties xmlns:p="http://schemas.microsoft.com/office/2006/metadata/properties" xmlns:xsi="http://www.w3.org/2001/XMLSchema-instance" xmlns:pc="http://schemas.microsoft.com/office/infopath/2007/PartnerControls">
   <documentManagement>
@@ -11619,6 +12120,14 @@
 </file>
 
 <file path=customXml/itemProps1.xml><?xml version="1.0" encoding="utf-8"?>
+<ds:datastoreItem xmlns:ds="http://schemas.openxmlformats.org/officeDocument/2006/customXml" ds:itemID="{33A2B218-4FC3-469B-A2C0-BF247A0E867B}">
+  <ds:schemaRefs>
+    <ds:schemaRef ds:uri="http://schemas.microsoft.com/sharepoint/v3/contenttype/forms"/>
+  </ds:schemaRefs>
+</ds:datastoreItem>
+</file>
+
+<file path=customXml/itemProps2.xml><?xml version="1.0" encoding="utf-8"?>
 <ds:datastoreItem xmlns:ds="http://schemas.openxmlformats.org/officeDocument/2006/customXml" ds:itemID="{F7CFC312-B933-4005-9ADA-34F165F7358A}">
   <ds:schemaRefs>
     <ds:schemaRef ds:uri="http://schemas.microsoft.com/office/2006/metadata/contentType"/>
@@ -11638,14 +12147,6 @@
 </ds:datastoreItem>
 </file>
 
-<file path=customXml/itemProps2.xml><?xml version="1.0" encoding="utf-8"?>
-<ds:datastoreItem xmlns:ds="http://schemas.openxmlformats.org/officeDocument/2006/customXml" ds:itemID="{33A2B218-4FC3-469B-A2C0-BF247A0E867B}">
-  <ds:schemaRefs>
-    <ds:schemaRef ds:uri="http://schemas.microsoft.com/sharepoint/v3/contenttype/forms"/>
-  </ds:schemaRefs>
-</ds:datastoreItem>
-</file>
-
 <file path=customXml/itemProps3.xml><?xml version="1.0" encoding="utf-8"?>
 <ds:datastoreItem xmlns:ds="http://schemas.openxmlformats.org/officeDocument/2006/customXml" ds:itemID="{60C67BEE-D13F-4BD2-98A5-34D8A0977F68}">
   <ds:schemaRefs>

</xml_diff>

<commit_message>
Fixed pres and tasks
</commit_message>
<xml_diff>
--- a/docs/RMD-Presentation.pptx
+++ b/docs/RMD-Presentation.pptx
@@ -30,7 +30,7 @@
     <p:sldId id="291" r:id="rId21"/>
   </p:sldIdLst>
   <p:sldSz cx="12188825" cy="6858000"/>
-  <p:notesSz cx="6858000" cy="9296400"/>
+  <p:notesSz cx="7010400" cy="9296400"/>
   <p:defaultTextStyle>
     <a:defPPr>
       <a:defRPr lang="en-US"/>
@@ -148,7 +148,7 @@
             <a:srgbClr val="A4A3A4"/>
           </p15:clr>
         </p15:guide>
-        <p15:guide id="2" pos="2160" userDrawn="1">
+        <p15:guide id="2" pos="2208" userDrawn="1">
           <p15:clr>
             <a:srgbClr val="A4A3A4"/>
           </p15:clr>
@@ -162,7 +162,7 @@
 <file path=ppt/revisionInfo.xml><?xml version="1.0" encoding="utf-8"?>
 <p1510:revInfo xmlns:a="http://schemas.openxmlformats.org/drawingml/2006/main" xmlns:r="http://schemas.openxmlformats.org/officeDocument/2006/relationships" xmlns:p1510="http://schemas.microsoft.com/office/powerpoint/2015/10/main">
   <p1510:revLst>
-    <p1510:client id="{9D51384A-06A3-4410-8BBF-4FD5D23211D3}" v="34" dt="2020-03-30T14:44:25.193"/>
+    <p1510:client id="{9D51384A-06A3-4410-8BBF-4FD5D23211D3}" v="35" dt="2020-03-30T15:59:00.474"/>
   </p1510:revLst>
 </p1510:revInfo>
 </file>
@@ -171,13 +171,13 @@
 <pc:chgInfo xmlns:a="http://schemas.openxmlformats.org/drawingml/2006/main" xmlns:r="http://schemas.openxmlformats.org/officeDocument/2006/relationships" xmlns:ac="http://schemas.microsoft.com/office/drawing/2013/main/command" xmlns:pc="http://schemas.microsoft.com/office/powerpoint/2013/main/command">
   <pc:docChgLst>
     <pc:chgData name="Belinsky, Charles" userId="df390934-7dca-40c8-90db-c8d8d67e4ef2" providerId="ADAL" clId="{9D51384A-06A3-4410-8BBF-4FD5D23211D3}"/>
-    <pc:docChg chg="undo custSel addSld modSld modMainMaster modShowInfo">
-      <pc:chgData name="Belinsky, Charles" userId="df390934-7dca-40c8-90db-c8d8d67e4ef2" providerId="ADAL" clId="{9D51384A-06A3-4410-8BBF-4FD5D23211D3}" dt="2020-03-30T14:44:25.711" v="3797" actId="255"/>
+    <pc:docChg chg="undo custSel addSld modSld modMainMaster modNotesMaster modHandout modShowInfo">
+      <pc:chgData name="Belinsky, Charles" userId="df390934-7dca-40c8-90db-c8d8d67e4ef2" providerId="ADAL" clId="{9D51384A-06A3-4410-8BBF-4FD5D23211D3}" dt="2020-03-30T16:48:11.891" v="3827" actId="5793"/>
       <pc:docMkLst>
         <pc:docMk/>
       </pc:docMkLst>
-      <pc:sldChg chg="modSp mod modNotesTx">
-        <pc:chgData name="Belinsky, Charles" userId="df390934-7dca-40c8-90db-c8d8d67e4ef2" providerId="ADAL" clId="{9D51384A-06A3-4410-8BBF-4FD5D23211D3}" dt="2020-03-30T13:30:44.964" v="1784" actId="20577"/>
+      <pc:sldChg chg="modSp mod modNotes modNotesTx">
+        <pc:chgData name="Belinsky, Charles" userId="df390934-7dca-40c8-90db-c8d8d67e4ef2" providerId="ADAL" clId="{9D51384A-06A3-4410-8BBF-4FD5D23211D3}" dt="2020-03-30T15:59:00.474" v="3798"/>
         <pc:sldMkLst>
           <pc:docMk/>
           <pc:sldMk cId="3529114326" sldId="268"/>
@@ -191,8 +191,8 @@
           </ac:spMkLst>
         </pc:spChg>
       </pc:sldChg>
-      <pc:sldChg chg="modSp mod modNotesTx">
-        <pc:chgData name="Belinsky, Charles" userId="df390934-7dca-40c8-90db-c8d8d67e4ef2" providerId="ADAL" clId="{9D51384A-06A3-4410-8BBF-4FD5D23211D3}" dt="2020-03-30T14:03:35.790" v="3216" actId="20577"/>
+      <pc:sldChg chg="modSp mod modNotes modNotesTx">
+        <pc:chgData name="Belinsky, Charles" userId="df390934-7dca-40c8-90db-c8d8d67e4ef2" providerId="ADAL" clId="{9D51384A-06A3-4410-8BBF-4FD5D23211D3}" dt="2020-03-30T15:59:00.474" v="3798"/>
         <pc:sldMkLst>
           <pc:docMk/>
           <pc:sldMk cId="2895583067" sldId="272"/>
@@ -206,8 +206,8 @@
           </ac:spMkLst>
         </pc:spChg>
       </pc:sldChg>
-      <pc:sldChg chg="modSp mod modNotesTx">
-        <pc:chgData name="Belinsky, Charles" userId="df390934-7dca-40c8-90db-c8d8d67e4ef2" providerId="ADAL" clId="{9D51384A-06A3-4410-8BBF-4FD5D23211D3}" dt="2020-03-30T13:20:09.636" v="1161" actId="20577"/>
+      <pc:sldChg chg="modSp mod modNotes modNotesTx">
+        <pc:chgData name="Belinsky, Charles" userId="df390934-7dca-40c8-90db-c8d8d67e4ef2" providerId="ADAL" clId="{9D51384A-06A3-4410-8BBF-4FD5D23211D3}" dt="2020-03-30T15:59:00.474" v="3798"/>
         <pc:sldMkLst>
           <pc:docMk/>
           <pc:sldMk cId="2270281720" sldId="281"/>
@@ -221,8 +221,8 @@
           </ac:spMkLst>
         </pc:spChg>
       </pc:sldChg>
-      <pc:sldChg chg="modSp mod modNotesTx">
-        <pc:chgData name="Belinsky, Charles" userId="df390934-7dca-40c8-90db-c8d8d67e4ef2" providerId="ADAL" clId="{9D51384A-06A3-4410-8BBF-4FD5D23211D3}" dt="2020-03-30T13:36:56.251" v="2070" actId="20577"/>
+      <pc:sldChg chg="modSp mod modNotes modNotesTx">
+        <pc:chgData name="Belinsky, Charles" userId="df390934-7dca-40c8-90db-c8d8d67e4ef2" providerId="ADAL" clId="{9D51384A-06A3-4410-8BBF-4FD5D23211D3}" dt="2020-03-30T15:59:00.474" v="3798"/>
         <pc:sldMkLst>
           <pc:docMk/>
           <pc:sldMk cId="2286440866" sldId="282"/>
@@ -244,8 +244,8 @@
           </ac:spMkLst>
         </pc:spChg>
       </pc:sldChg>
-      <pc:sldChg chg="modSp mod modNotesTx">
-        <pc:chgData name="Belinsky, Charles" userId="df390934-7dca-40c8-90db-c8d8d67e4ef2" providerId="ADAL" clId="{9D51384A-06A3-4410-8BBF-4FD5D23211D3}" dt="2020-03-30T13:41:03.092" v="2299" actId="20577"/>
+      <pc:sldChg chg="modSp mod modNotes modNotesTx">
+        <pc:chgData name="Belinsky, Charles" userId="df390934-7dca-40c8-90db-c8d8d67e4ef2" providerId="ADAL" clId="{9D51384A-06A3-4410-8BBF-4FD5D23211D3}" dt="2020-03-30T15:59:00.474" v="3798"/>
         <pc:sldMkLst>
           <pc:docMk/>
           <pc:sldMk cId="1411325298" sldId="283"/>
@@ -267,8 +267,8 @@
           </ac:spMkLst>
         </pc:spChg>
       </pc:sldChg>
-      <pc:sldChg chg="modSp mod modNotesTx">
-        <pc:chgData name="Belinsky, Charles" userId="df390934-7dca-40c8-90db-c8d8d67e4ef2" providerId="ADAL" clId="{9D51384A-06A3-4410-8BBF-4FD5D23211D3}" dt="2020-03-30T13:48:11.321" v="2791" actId="20577"/>
+      <pc:sldChg chg="modSp mod modNotes modNotesTx">
+        <pc:chgData name="Belinsky, Charles" userId="df390934-7dca-40c8-90db-c8d8d67e4ef2" providerId="ADAL" clId="{9D51384A-06A3-4410-8BBF-4FD5D23211D3}" dt="2020-03-30T15:59:00.474" v="3798"/>
         <pc:sldMkLst>
           <pc:docMk/>
           <pc:sldMk cId="3569865002" sldId="284"/>
@@ -290,8 +290,8 @@
           </ac:spMkLst>
         </pc:spChg>
       </pc:sldChg>
-      <pc:sldChg chg="modSp mod">
-        <pc:chgData name="Belinsky, Charles" userId="df390934-7dca-40c8-90db-c8d8d67e4ef2" providerId="ADAL" clId="{9D51384A-06A3-4410-8BBF-4FD5D23211D3}" dt="2020-03-30T13:51:47.626" v="2863" actId="20577"/>
+      <pc:sldChg chg="modSp mod modNotes">
+        <pc:chgData name="Belinsky, Charles" userId="df390934-7dca-40c8-90db-c8d8d67e4ef2" providerId="ADAL" clId="{9D51384A-06A3-4410-8BBF-4FD5D23211D3}" dt="2020-03-30T15:59:00.474" v="3798"/>
         <pc:sldMkLst>
           <pc:docMk/>
           <pc:sldMk cId="4124782566" sldId="285"/>
@@ -313,8 +313,8 @@
           </ac:spMkLst>
         </pc:spChg>
       </pc:sldChg>
-      <pc:sldChg chg="modSp mod">
-        <pc:chgData name="Belinsky, Charles" userId="df390934-7dca-40c8-90db-c8d8d67e4ef2" providerId="ADAL" clId="{9D51384A-06A3-4410-8BBF-4FD5D23211D3}" dt="2020-03-30T14:08:33.730" v="3316" actId="20577"/>
+      <pc:sldChg chg="modSp mod modNotes">
+        <pc:chgData name="Belinsky, Charles" userId="df390934-7dca-40c8-90db-c8d8d67e4ef2" providerId="ADAL" clId="{9D51384A-06A3-4410-8BBF-4FD5D23211D3}" dt="2020-03-30T15:59:00.474" v="3798"/>
         <pc:sldMkLst>
           <pc:docMk/>
           <pc:sldMk cId="3272729281" sldId="286"/>
@@ -336,8 +336,8 @@
           </ac:spMkLst>
         </pc:spChg>
       </pc:sldChg>
-      <pc:sldChg chg="modSp mod modNotesTx">
-        <pc:chgData name="Belinsky, Charles" userId="df390934-7dca-40c8-90db-c8d8d67e4ef2" providerId="ADAL" clId="{9D51384A-06A3-4410-8BBF-4FD5D23211D3}" dt="2020-03-30T14:27:54.781" v="3445" actId="27636"/>
+      <pc:sldChg chg="modSp mod modNotes modNotesTx">
+        <pc:chgData name="Belinsky, Charles" userId="df390934-7dca-40c8-90db-c8d8d67e4ef2" providerId="ADAL" clId="{9D51384A-06A3-4410-8BBF-4FD5D23211D3}" dt="2020-03-30T15:59:00.474" v="3798"/>
         <pc:sldMkLst>
           <pc:docMk/>
           <pc:sldMk cId="1509648475" sldId="289"/>
@@ -359,8 +359,8 @@
           </ac:spMkLst>
         </pc:spChg>
       </pc:sldChg>
-      <pc:sldChg chg="modSp mod modNotesTx">
-        <pc:chgData name="Belinsky, Charles" userId="df390934-7dca-40c8-90db-c8d8d67e4ef2" providerId="ADAL" clId="{9D51384A-06A3-4410-8BBF-4FD5D23211D3}" dt="2020-03-30T14:29:12.304" v="3575" actId="20577"/>
+      <pc:sldChg chg="modSp mod modNotes modNotesTx">
+        <pc:chgData name="Belinsky, Charles" userId="df390934-7dca-40c8-90db-c8d8d67e4ef2" providerId="ADAL" clId="{9D51384A-06A3-4410-8BBF-4FD5D23211D3}" dt="2020-03-30T15:59:00.474" v="3798"/>
         <pc:sldMkLst>
           <pc:docMk/>
           <pc:sldMk cId="3969417241" sldId="290"/>
@@ -382,8 +382,8 @@
           </ac:spMkLst>
         </pc:spChg>
       </pc:sldChg>
-      <pc:sldChg chg="modSp mod modNotesTx">
-        <pc:chgData name="Belinsky, Charles" userId="df390934-7dca-40c8-90db-c8d8d67e4ef2" providerId="ADAL" clId="{9D51384A-06A3-4410-8BBF-4FD5D23211D3}" dt="2020-03-30T14:31:27.832" v="3795" actId="20577"/>
+      <pc:sldChg chg="modSp mod modNotes modNotesTx">
+        <pc:chgData name="Belinsky, Charles" userId="df390934-7dca-40c8-90db-c8d8d67e4ef2" providerId="ADAL" clId="{9D51384A-06A3-4410-8BBF-4FD5D23211D3}" dt="2020-03-30T15:59:00.474" v="3798"/>
         <pc:sldMkLst>
           <pc:docMk/>
           <pc:sldMk cId="2875170762" sldId="291"/>
@@ -405,8 +405,8 @@
           </ac:spMkLst>
         </pc:spChg>
       </pc:sldChg>
-      <pc:sldChg chg="modSp mod modNotesTx">
-        <pc:chgData name="Belinsky, Charles" userId="df390934-7dca-40c8-90db-c8d8d67e4ef2" providerId="ADAL" clId="{9D51384A-06A3-4410-8BBF-4FD5D23211D3}" dt="2020-03-30T13:28:23.283" v="1654" actId="20577"/>
+      <pc:sldChg chg="modSp mod modNotes modNotesTx">
+        <pc:chgData name="Belinsky, Charles" userId="df390934-7dca-40c8-90db-c8d8d67e4ef2" providerId="ADAL" clId="{9D51384A-06A3-4410-8BBF-4FD5D23211D3}" dt="2020-03-30T15:59:00.474" v="3798"/>
         <pc:sldMkLst>
           <pc:docMk/>
           <pc:sldMk cId="1690464180" sldId="293"/>
@@ -420,8 +420,8 @@
           </ac:spMkLst>
         </pc:spChg>
       </pc:sldChg>
-      <pc:sldChg chg="modSp mod">
-        <pc:chgData name="Belinsky, Charles" userId="df390934-7dca-40c8-90db-c8d8d67e4ef2" providerId="ADAL" clId="{9D51384A-06A3-4410-8BBF-4FD5D23211D3}" dt="2020-03-30T13:52:54.034" v="2902" actId="20577"/>
+      <pc:sldChg chg="modSp mod modNotes">
+        <pc:chgData name="Belinsky, Charles" userId="df390934-7dca-40c8-90db-c8d8d67e4ef2" providerId="ADAL" clId="{9D51384A-06A3-4410-8BBF-4FD5D23211D3}" dt="2020-03-30T15:59:00.474" v="3798"/>
         <pc:sldMkLst>
           <pc:docMk/>
           <pc:sldMk cId="2451106529" sldId="294"/>
@@ -443,8 +443,8 @@
           </ac:spMkLst>
         </pc:spChg>
       </pc:sldChg>
-      <pc:sldChg chg="modSp mod">
-        <pc:chgData name="Belinsky, Charles" userId="df390934-7dca-40c8-90db-c8d8d67e4ef2" providerId="ADAL" clId="{9D51384A-06A3-4410-8BBF-4FD5D23211D3}" dt="2020-03-30T13:12:43.062" v="777" actId="114"/>
+      <pc:sldChg chg="modSp mod modNotes">
+        <pc:chgData name="Belinsky, Charles" userId="df390934-7dca-40c8-90db-c8d8d67e4ef2" providerId="ADAL" clId="{9D51384A-06A3-4410-8BBF-4FD5D23211D3}" dt="2020-03-30T15:59:00.474" v="3798"/>
         <pc:sldMkLst>
           <pc:docMk/>
           <pc:sldMk cId="2109213187" sldId="295"/>
@@ -458,14 +458,14 @@
           </ac:spMkLst>
         </pc:spChg>
       </pc:sldChg>
-      <pc:sldChg chg="modSp mod">
-        <pc:chgData name="Belinsky, Charles" userId="df390934-7dca-40c8-90db-c8d8d67e4ef2" providerId="ADAL" clId="{9D51384A-06A3-4410-8BBF-4FD5D23211D3}" dt="2020-03-30T13:14:29.629" v="785" actId="20577"/>
+      <pc:sldChg chg="modSp mod modNotes">
+        <pc:chgData name="Belinsky, Charles" userId="df390934-7dca-40c8-90db-c8d8d67e4ef2" providerId="ADAL" clId="{9D51384A-06A3-4410-8BBF-4FD5D23211D3}" dt="2020-03-30T16:48:11.891" v="3827" actId="5793"/>
         <pc:sldMkLst>
           <pc:docMk/>
           <pc:sldMk cId="139896278" sldId="297"/>
         </pc:sldMkLst>
         <pc:spChg chg="mod">
-          <ac:chgData name="Belinsky, Charles" userId="df390934-7dca-40c8-90db-c8d8d67e4ef2" providerId="ADAL" clId="{9D51384A-06A3-4410-8BBF-4FD5D23211D3}" dt="2020-03-30T13:14:29.629" v="785" actId="20577"/>
+          <ac:chgData name="Belinsky, Charles" userId="df390934-7dca-40c8-90db-c8d8d67e4ef2" providerId="ADAL" clId="{9D51384A-06A3-4410-8BBF-4FD5D23211D3}" dt="2020-03-30T16:48:11.891" v="3827" actId="5793"/>
           <ac:spMkLst>
             <pc:docMk/>
             <pc:sldMk cId="139896278" sldId="297"/>
@@ -473,8 +473,8 @@
           </ac:spMkLst>
         </pc:spChg>
       </pc:sldChg>
-      <pc:sldChg chg="modSp mod modNotesTx">
-        <pc:chgData name="Belinsky, Charles" userId="df390934-7dca-40c8-90db-c8d8d67e4ef2" providerId="ADAL" clId="{9D51384A-06A3-4410-8BBF-4FD5D23211D3}" dt="2020-03-30T14:44:25.711" v="3797" actId="255"/>
+      <pc:sldChg chg="modSp mod modNotes modNotesTx">
+        <pc:chgData name="Belinsky, Charles" userId="df390934-7dca-40c8-90db-c8d8d67e4ef2" providerId="ADAL" clId="{9D51384A-06A3-4410-8BBF-4FD5D23211D3}" dt="2020-03-30T15:59:00.474" v="3798"/>
         <pc:sldMkLst>
           <pc:docMk/>
           <pc:sldMk cId="3336794585" sldId="299"/>
@@ -504,8 +504,8 @@
           </ac:spMkLst>
         </pc:spChg>
       </pc:sldChg>
-      <pc:sldChg chg="modSp add mod modNotesTx">
-        <pc:chgData name="Belinsky, Charles" userId="df390934-7dca-40c8-90db-c8d8d67e4ef2" providerId="ADAL" clId="{9D51384A-06A3-4410-8BBF-4FD5D23211D3}" dt="2020-03-30T12:51:16.997" v="684" actId="20577"/>
+      <pc:sldChg chg="modSp add mod modNotes modNotesTx">
+        <pc:chgData name="Belinsky, Charles" userId="df390934-7dca-40c8-90db-c8d8d67e4ef2" providerId="ADAL" clId="{9D51384A-06A3-4410-8BBF-4FD5D23211D3}" dt="2020-03-30T15:59:00.474" v="3798"/>
         <pc:sldMkLst>
           <pc:docMk/>
           <pc:sldMk cId="3229575491" sldId="300"/>
@@ -973,7 +973,7 @@
         <p:spPr>
           <a:xfrm>
             <a:off x="0" y="0"/>
-            <a:ext cx="2971800" cy="464820"/>
+            <a:ext cx="3037840" cy="464820"/>
           </a:xfrm>
           <a:prstGeom prst="rect">
             <a:avLst/>
@@ -1003,8 +1003,8 @@
         </p:nvSpPr>
         <p:spPr>
           <a:xfrm>
-            <a:off x="3884613" y="0"/>
-            <a:ext cx="2971800" cy="464820"/>
+            <a:off x="3970938" y="0"/>
+            <a:ext cx="3037840" cy="464820"/>
           </a:xfrm>
           <a:prstGeom prst="rect">
             <a:avLst/>
@@ -1039,7 +1039,7 @@
         <p:spPr>
           <a:xfrm>
             <a:off x="0" y="8829967"/>
-            <a:ext cx="2971800" cy="464820"/>
+            <a:ext cx="3037840" cy="464820"/>
           </a:xfrm>
           <a:prstGeom prst="rect">
             <a:avLst/>
@@ -1069,8 +1069,8 @@
         </p:nvSpPr>
         <p:spPr>
           <a:xfrm>
-            <a:off x="3884613" y="8829967"/>
-            <a:ext cx="2971800" cy="464820"/>
+            <a:off x="3970938" y="8829967"/>
+            <a:ext cx="3037840" cy="464820"/>
           </a:xfrm>
           <a:prstGeom prst="rect">
             <a:avLst/>
@@ -1138,7 +1138,7 @@
         <p:spPr>
           <a:xfrm>
             <a:off x="0" y="0"/>
-            <a:ext cx="2971800" cy="464820"/>
+            <a:ext cx="3037840" cy="464820"/>
           </a:xfrm>
           <a:prstGeom prst="rect">
             <a:avLst/>
@@ -1168,8 +1168,8 @@
         </p:nvSpPr>
         <p:spPr>
           <a:xfrm>
-            <a:off x="3884613" y="0"/>
-            <a:ext cx="2971800" cy="464820"/>
+            <a:off x="3970938" y="0"/>
+            <a:ext cx="3037840" cy="464820"/>
           </a:xfrm>
           <a:prstGeom prst="rect">
             <a:avLst/>
@@ -1203,7 +1203,7 @@
         </p:nvSpPr>
         <p:spPr>
           <a:xfrm>
-            <a:off x="331788" y="696913"/>
+            <a:off x="407988" y="696913"/>
             <a:ext cx="6194425" cy="3486150"/>
           </a:xfrm>
           <a:prstGeom prst="rect">
@@ -1236,8 +1236,8 @@
         </p:nvSpPr>
         <p:spPr>
           <a:xfrm>
-            <a:off x="685800" y="4415790"/>
-            <a:ext cx="5486400" cy="4183380"/>
+            <a:off x="701040" y="4415790"/>
+            <a:ext cx="5608320" cy="4183380"/>
           </a:xfrm>
           <a:prstGeom prst="rect">
             <a:avLst/>
@@ -1291,7 +1291,7 @@
         <p:spPr>
           <a:xfrm>
             <a:off x="0" y="8829967"/>
-            <a:ext cx="2971800" cy="464820"/>
+            <a:ext cx="3037840" cy="464820"/>
           </a:xfrm>
           <a:prstGeom prst="rect">
             <a:avLst/>
@@ -1321,8 +1321,8 @@
         </p:nvSpPr>
         <p:spPr>
           <a:xfrm>
-            <a:off x="3884613" y="8829967"/>
-            <a:ext cx="2971800" cy="464820"/>
+            <a:off x="3970938" y="8829967"/>
+            <a:ext cx="3037840" cy="464820"/>
           </a:xfrm>
           <a:prstGeom prst="rect">
             <a:avLst/>
@@ -1476,7 +1476,7 @@
         </p:nvSpPr>
         <p:spPr>
           <a:xfrm>
-            <a:off x="331788" y="696913"/>
+            <a:off x="407988" y="696913"/>
             <a:ext cx="6194425" cy="3486150"/>
           </a:xfrm>
         </p:spPr>
@@ -1568,7 +1568,7 @@
         </p:nvSpPr>
         <p:spPr>
           <a:xfrm>
-            <a:off x="331788" y="696913"/>
+            <a:off x="407988" y="696913"/>
             <a:ext cx="6194425" cy="3486150"/>
           </a:xfrm>
         </p:spPr>
@@ -1672,7 +1672,7 @@
         </p:nvSpPr>
         <p:spPr>
           <a:xfrm>
-            <a:off x="331788" y="696913"/>
+            <a:off x="407988" y="696913"/>
             <a:ext cx="6194425" cy="3486150"/>
           </a:xfrm>
         </p:spPr>
@@ -1776,7 +1776,7 @@
         </p:nvSpPr>
         <p:spPr>
           <a:xfrm>
-            <a:off x="331788" y="696913"/>
+            <a:off x="407988" y="696913"/>
             <a:ext cx="6194425" cy="3486150"/>
           </a:xfrm>
         </p:spPr>
@@ -1865,7 +1865,7 @@
         </p:nvSpPr>
         <p:spPr>
           <a:xfrm>
-            <a:off x="331788" y="696913"/>
+            <a:off x="407988" y="696913"/>
             <a:ext cx="6194425" cy="3486150"/>
           </a:xfrm>
         </p:spPr>
@@ -1979,7 +1979,7 @@
         </p:nvSpPr>
         <p:spPr>
           <a:xfrm>
-            <a:off x="331788" y="696913"/>
+            <a:off x="407988" y="696913"/>
             <a:ext cx="6194425" cy="3486150"/>
           </a:xfrm>
         </p:spPr>
@@ -2068,7 +2068,7 @@
         </p:nvSpPr>
         <p:spPr>
           <a:xfrm>
-            <a:off x="331788" y="696913"/>
+            <a:off x="407988" y="696913"/>
             <a:ext cx="6194425" cy="3486150"/>
           </a:xfrm>
         </p:spPr>
@@ -2160,7 +2160,7 @@
         </p:nvSpPr>
         <p:spPr>
           <a:xfrm>
-            <a:off x="331788" y="696913"/>
+            <a:off x="407988" y="696913"/>
             <a:ext cx="6194425" cy="3486150"/>
           </a:xfrm>
         </p:spPr>
@@ -2257,7 +2257,7 @@
         </p:nvSpPr>
         <p:spPr>
           <a:xfrm>
-            <a:off x="331788" y="696913"/>
+            <a:off x="407988" y="696913"/>
             <a:ext cx="6194425" cy="3486150"/>
           </a:xfrm>
         </p:spPr>
@@ -2353,7 +2353,7 @@
         </p:nvSpPr>
         <p:spPr>
           <a:xfrm>
-            <a:off x="331788" y="696913"/>
+            <a:off x="407988" y="696913"/>
             <a:ext cx="6194425" cy="3486150"/>
           </a:xfrm>
         </p:spPr>
@@ -2451,7 +2451,7 @@
         </p:nvSpPr>
         <p:spPr>
           <a:xfrm>
-            <a:off x="331788" y="696913"/>
+            <a:off x="407988" y="696913"/>
             <a:ext cx="6194425" cy="3486150"/>
           </a:xfrm>
         </p:spPr>
@@ -2549,7 +2549,7 @@
         </p:nvSpPr>
         <p:spPr>
           <a:xfrm>
-            <a:off x="331788" y="696913"/>
+            <a:off x="407988" y="696913"/>
             <a:ext cx="6194425" cy="3486150"/>
           </a:xfrm>
         </p:spPr>
@@ -2653,7 +2653,7 @@
         </p:nvSpPr>
         <p:spPr>
           <a:xfrm>
-            <a:off x="331788" y="696913"/>
+            <a:off x="407988" y="696913"/>
             <a:ext cx="6194425" cy="3486150"/>
           </a:xfrm>
         </p:spPr>
@@ -2754,7 +2754,7 @@
         </p:nvSpPr>
         <p:spPr>
           <a:xfrm>
-            <a:off x="331788" y="696913"/>
+            <a:off x="407988" y="696913"/>
             <a:ext cx="6194425" cy="3486150"/>
           </a:xfrm>
         </p:spPr>
@@ -2857,7 +2857,7 @@
         </p:nvSpPr>
         <p:spPr>
           <a:xfrm>
-            <a:off x="331788" y="696913"/>
+            <a:off x="407988" y="696913"/>
             <a:ext cx="6194425" cy="3486150"/>
           </a:xfrm>
         </p:spPr>
@@ -2949,7 +2949,7 @@
         </p:nvSpPr>
         <p:spPr>
           <a:xfrm>
-            <a:off x="331788" y="696913"/>
+            <a:off x="407988" y="696913"/>
             <a:ext cx="6194425" cy="3486150"/>
           </a:xfrm>
         </p:spPr>
@@ -3047,7 +3047,7 @@
         </p:nvSpPr>
         <p:spPr>
           <a:xfrm>
-            <a:off x="331788" y="696913"/>
+            <a:off x="407988" y="696913"/>
             <a:ext cx="6194425" cy="3486150"/>
           </a:xfrm>
         </p:spPr>
@@ -9850,7 +9850,15 @@
           <a:p>
             <a:r>
               <a:rPr lang="en-US" dirty="0"/>
-              <a:t>Put linked folders at the top</a:t>
+              <a:t>Put all linked files (data</a:t>
+            </a:r>
+            <a:r>
+              <a:rPr lang="en-US"/>
+              <a:t>, scripts…) at </a:t>
+            </a:r>
+            <a:r>
+              <a:rPr lang="en-US" dirty="0"/>
+              <a:t>the top</a:t>
             </a:r>
           </a:p>
           <a:p>
@@ -11868,15 +11876,6 @@
 </file>
 
 <file path=customXml/item1.xml><?xml version="1.0" encoding="utf-8"?>
-<?mso-contentType ?>
-<FormTemplates xmlns="http://schemas.microsoft.com/sharepoint/v3/contenttype/forms">
-  <Display>DocumentLibraryForm</Display>
-  <Edit>DocumentLibraryForm</Edit>
-  <New>DocumentLibraryForm</New>
-</FormTemplates>
-</file>
-
-<file path=customXml/item2.xml><?xml version="1.0" encoding="utf-8"?>
 <ct:contentTypeSchema xmlns:ct="http://schemas.microsoft.com/office/2006/metadata/contentType" xmlns:ma="http://schemas.microsoft.com/office/2006/metadata/properties/metaAttributes" ct:_="" ma:_="" ma:contentTypeName="Document" ma:contentTypeID="0x0101003DB5B97B54300B4889C1AC7361F68213" ma:contentTypeVersion="14" ma:contentTypeDescription="Create a new document." ma:contentTypeScope="" ma:versionID="b3a4fb828f3a04ce1ee1646d58eb04a7">
   <xsd:schema xmlns:xsd="http://www.w3.org/2001/XMLSchema" xmlns:xs="http://www.w3.org/2001/XMLSchema" xmlns:p="http://schemas.microsoft.com/office/2006/metadata/properties" xmlns:ns1="http://schemas.microsoft.com/sharepoint/v3" xmlns:ns2="0b3136f0-a1b3-4de4-aaf6-47b51dbb702c" xmlns:ns3="3076eba4-c0ca-4bad-b773-16a3112e7607" targetNamespace="http://schemas.microsoft.com/office/2006/metadata/properties" ma:root="true" ma:fieldsID="fc7abf6f59e632741c2abb53f83e984a" ns1:_="" ns2:_="" ns3:_="">
     <xsd:import namespace="http://schemas.microsoft.com/sharepoint/v3"/>
@@ -12110,6 +12109,15 @@
 </ct:contentTypeSchema>
 </file>
 
+<file path=customXml/item2.xml><?xml version="1.0" encoding="utf-8"?>
+<?mso-contentType ?>
+<FormTemplates xmlns="http://schemas.microsoft.com/sharepoint/v3/contenttype/forms">
+  <Display>DocumentLibraryForm</Display>
+  <Edit>DocumentLibraryForm</Edit>
+  <New>DocumentLibraryForm</New>
+</FormTemplates>
+</file>
+
 <file path=customXml/item3.xml><?xml version="1.0" encoding="utf-8"?>
 <p:properties xmlns:p="http://schemas.microsoft.com/office/2006/metadata/properties" xmlns:xsi="http://www.w3.org/2001/XMLSchema-instance" xmlns:pc="http://schemas.microsoft.com/office/infopath/2007/PartnerControls">
   <documentManagement>
@@ -12120,14 +12128,6 @@
 </file>
 
 <file path=customXml/itemProps1.xml><?xml version="1.0" encoding="utf-8"?>
-<ds:datastoreItem xmlns:ds="http://schemas.openxmlformats.org/officeDocument/2006/customXml" ds:itemID="{33A2B218-4FC3-469B-A2C0-BF247A0E867B}">
-  <ds:schemaRefs>
-    <ds:schemaRef ds:uri="http://schemas.microsoft.com/sharepoint/v3/contenttype/forms"/>
-  </ds:schemaRefs>
-</ds:datastoreItem>
-</file>
-
-<file path=customXml/itemProps2.xml><?xml version="1.0" encoding="utf-8"?>
 <ds:datastoreItem xmlns:ds="http://schemas.openxmlformats.org/officeDocument/2006/customXml" ds:itemID="{F7CFC312-B933-4005-9ADA-34F165F7358A}">
   <ds:schemaRefs>
     <ds:schemaRef ds:uri="http://schemas.microsoft.com/office/2006/metadata/contentType"/>
@@ -12147,12 +12147,28 @@
 </ds:datastoreItem>
 </file>
 
+<file path=customXml/itemProps2.xml><?xml version="1.0" encoding="utf-8"?>
+<ds:datastoreItem xmlns:ds="http://schemas.openxmlformats.org/officeDocument/2006/customXml" ds:itemID="{33A2B218-4FC3-469B-A2C0-BF247A0E867B}">
+  <ds:schemaRefs>
+    <ds:schemaRef ds:uri="http://schemas.microsoft.com/sharepoint/v3/contenttype/forms"/>
+  </ds:schemaRefs>
+</ds:datastoreItem>
+</file>
+
 <file path=customXml/itemProps3.xml><?xml version="1.0" encoding="utf-8"?>
 <ds:datastoreItem xmlns:ds="http://schemas.openxmlformats.org/officeDocument/2006/customXml" ds:itemID="{60C67BEE-D13F-4BD2-98A5-34D8A0977F68}">
   <ds:schemaRefs>
+    <ds:schemaRef ds:uri="http://schemas.openxmlformats.org/package/2006/metadata/core-properties"/>
+    <ds:schemaRef ds:uri="http://schemas.microsoft.com/office/infopath/2007/PartnerControls"/>
     <ds:schemaRef ds:uri="http://schemas.microsoft.com/office/2006/metadata/properties"/>
-    <ds:schemaRef ds:uri="http://schemas.microsoft.com/office/infopath/2007/PartnerControls"/>
+    <ds:schemaRef ds:uri="http://schemas.microsoft.com/office/2006/documentManagement/types"/>
+    <ds:schemaRef ds:uri="0b3136f0-a1b3-4de4-aaf6-47b51dbb702c"/>
+    <ds:schemaRef ds:uri="http://purl.org/dc/terms/"/>
+    <ds:schemaRef ds:uri="http://purl.org/dc/elements/1.1/"/>
+    <ds:schemaRef ds:uri="http://www.w3.org/XML/1998/namespace"/>
+    <ds:schemaRef ds:uri="3076eba4-c0ca-4bad-b773-16a3112e7607"/>
     <ds:schemaRef ds:uri="http://schemas.microsoft.com/sharepoint/v3"/>
+    <ds:schemaRef ds:uri="http://purl.org/dc/dcmitype/"/>
   </ds:schemaRefs>
 </ds:datastoreItem>
 </file>
</xml_diff>

<commit_message>
remove notes from pp
</commit_message>
<xml_diff>
--- a/docs/RMD-Presentation.pptx
+++ b/docs/RMD-Presentation.pptx
@@ -172,12 +172,12 @@
   <pc:docChgLst>
     <pc:chgData name="Belinsky, Charles" userId="df390934-7dca-40c8-90db-c8d8d67e4ef2" providerId="ADAL" clId="{9D51384A-06A3-4410-8BBF-4FD5D23211D3}"/>
     <pc:docChg chg="undo custSel addSld modSld modMainMaster modNotesMaster modHandout modShowInfo">
-      <pc:chgData name="Belinsky, Charles" userId="df390934-7dca-40c8-90db-c8d8d67e4ef2" providerId="ADAL" clId="{9D51384A-06A3-4410-8BBF-4FD5D23211D3}" dt="2020-03-30T16:48:11.891" v="3827" actId="5793"/>
+      <pc:chgData name="Belinsky, Charles" userId="df390934-7dca-40c8-90db-c8d8d67e4ef2" providerId="ADAL" clId="{9D51384A-06A3-4410-8BBF-4FD5D23211D3}" dt="2020-03-30T16:56:21.978" v="3841" actId="6549"/>
       <pc:docMkLst>
         <pc:docMk/>
       </pc:docMkLst>
       <pc:sldChg chg="modSp mod modNotes modNotesTx">
-        <pc:chgData name="Belinsky, Charles" userId="df390934-7dca-40c8-90db-c8d8d67e4ef2" providerId="ADAL" clId="{9D51384A-06A3-4410-8BBF-4FD5D23211D3}" dt="2020-03-30T15:59:00.474" v="3798"/>
+        <pc:chgData name="Belinsky, Charles" userId="df390934-7dca-40c8-90db-c8d8d67e4ef2" providerId="ADAL" clId="{9D51384A-06A3-4410-8BBF-4FD5D23211D3}" dt="2020-03-30T16:56:01.323" v="3834" actId="6549"/>
         <pc:sldMkLst>
           <pc:docMk/>
           <pc:sldMk cId="3529114326" sldId="268"/>
@@ -192,7 +192,7 @@
         </pc:spChg>
       </pc:sldChg>
       <pc:sldChg chg="modSp mod modNotes modNotesTx">
-        <pc:chgData name="Belinsky, Charles" userId="df390934-7dca-40c8-90db-c8d8d67e4ef2" providerId="ADAL" clId="{9D51384A-06A3-4410-8BBF-4FD5D23211D3}" dt="2020-03-30T15:59:00.474" v="3798"/>
+        <pc:chgData name="Belinsky, Charles" userId="df390934-7dca-40c8-90db-c8d8d67e4ef2" providerId="ADAL" clId="{9D51384A-06A3-4410-8BBF-4FD5D23211D3}" dt="2020-03-30T16:56:16.444" v="3839" actId="6549"/>
         <pc:sldMkLst>
           <pc:docMk/>
           <pc:sldMk cId="2895583067" sldId="272"/>
@@ -207,7 +207,7 @@
         </pc:spChg>
       </pc:sldChg>
       <pc:sldChg chg="modSp mod modNotes modNotesTx">
-        <pc:chgData name="Belinsky, Charles" userId="df390934-7dca-40c8-90db-c8d8d67e4ef2" providerId="ADAL" clId="{9D51384A-06A3-4410-8BBF-4FD5D23211D3}" dt="2020-03-30T15:59:00.474" v="3798"/>
+        <pc:chgData name="Belinsky, Charles" userId="df390934-7dca-40c8-90db-c8d8d67e4ef2" providerId="ADAL" clId="{9D51384A-06A3-4410-8BBF-4FD5D23211D3}" dt="2020-03-30T16:55:56.795" v="3832" actId="6549"/>
         <pc:sldMkLst>
           <pc:docMk/>
           <pc:sldMk cId="2270281720" sldId="281"/>
@@ -222,7 +222,7 @@
         </pc:spChg>
       </pc:sldChg>
       <pc:sldChg chg="modSp mod modNotes modNotesTx">
-        <pc:chgData name="Belinsky, Charles" userId="df390934-7dca-40c8-90db-c8d8d67e4ef2" providerId="ADAL" clId="{9D51384A-06A3-4410-8BBF-4FD5D23211D3}" dt="2020-03-30T15:59:00.474" v="3798"/>
+        <pc:chgData name="Belinsky, Charles" userId="df390934-7dca-40c8-90db-c8d8d67e4ef2" providerId="ADAL" clId="{9D51384A-06A3-4410-8BBF-4FD5D23211D3}" dt="2020-03-30T16:56:03.443" v="3835" actId="6549"/>
         <pc:sldMkLst>
           <pc:docMk/>
           <pc:sldMk cId="2286440866" sldId="282"/>
@@ -245,7 +245,7 @@
         </pc:spChg>
       </pc:sldChg>
       <pc:sldChg chg="modSp mod modNotes modNotesTx">
-        <pc:chgData name="Belinsky, Charles" userId="df390934-7dca-40c8-90db-c8d8d67e4ef2" providerId="ADAL" clId="{9D51384A-06A3-4410-8BBF-4FD5D23211D3}" dt="2020-03-30T15:59:00.474" v="3798"/>
+        <pc:chgData name="Belinsky, Charles" userId="df390934-7dca-40c8-90db-c8d8d67e4ef2" providerId="ADAL" clId="{9D51384A-06A3-4410-8BBF-4FD5D23211D3}" dt="2020-03-30T16:56:05.178" v="3836" actId="6549"/>
         <pc:sldMkLst>
           <pc:docMk/>
           <pc:sldMk cId="1411325298" sldId="283"/>
@@ -268,7 +268,7 @@
         </pc:spChg>
       </pc:sldChg>
       <pc:sldChg chg="modSp mod modNotes modNotesTx">
-        <pc:chgData name="Belinsky, Charles" userId="df390934-7dca-40c8-90db-c8d8d67e4ef2" providerId="ADAL" clId="{9D51384A-06A3-4410-8BBF-4FD5D23211D3}" dt="2020-03-30T15:59:00.474" v="3798"/>
+        <pc:chgData name="Belinsky, Charles" userId="df390934-7dca-40c8-90db-c8d8d67e4ef2" providerId="ADAL" clId="{9D51384A-06A3-4410-8BBF-4FD5D23211D3}" dt="2020-03-30T16:56:07.570" v="3837" actId="6549"/>
         <pc:sldMkLst>
           <pc:docMk/>
           <pc:sldMk cId="3569865002" sldId="284"/>
@@ -290,8 +290,8 @@
           </ac:spMkLst>
         </pc:spChg>
       </pc:sldChg>
-      <pc:sldChg chg="modSp mod modNotes">
-        <pc:chgData name="Belinsky, Charles" userId="df390934-7dca-40c8-90db-c8d8d67e4ef2" providerId="ADAL" clId="{9D51384A-06A3-4410-8BBF-4FD5D23211D3}" dt="2020-03-30T15:59:00.474" v="3798"/>
+      <pc:sldChg chg="modSp mod modNotes modNotesTx">
+        <pc:chgData name="Belinsky, Charles" userId="df390934-7dca-40c8-90db-c8d8d67e4ef2" providerId="ADAL" clId="{9D51384A-06A3-4410-8BBF-4FD5D23211D3}" dt="2020-03-30T16:56:12.331" v="3838" actId="6549"/>
         <pc:sldMkLst>
           <pc:docMk/>
           <pc:sldMk cId="4124782566" sldId="285"/>
@@ -337,7 +337,7 @@
         </pc:spChg>
       </pc:sldChg>
       <pc:sldChg chg="modSp mod modNotes modNotesTx">
-        <pc:chgData name="Belinsky, Charles" userId="df390934-7dca-40c8-90db-c8d8d67e4ef2" providerId="ADAL" clId="{9D51384A-06A3-4410-8BBF-4FD5D23211D3}" dt="2020-03-30T15:59:00.474" v="3798"/>
+        <pc:chgData name="Belinsky, Charles" userId="df390934-7dca-40c8-90db-c8d8d67e4ef2" providerId="ADAL" clId="{9D51384A-06A3-4410-8BBF-4FD5D23211D3}" dt="2020-03-30T16:56:20.106" v="3840" actId="6549"/>
         <pc:sldMkLst>
           <pc:docMk/>
           <pc:sldMk cId="1509648475" sldId="289"/>
@@ -360,7 +360,7 @@
         </pc:spChg>
       </pc:sldChg>
       <pc:sldChg chg="modSp mod modNotes modNotesTx">
-        <pc:chgData name="Belinsky, Charles" userId="df390934-7dca-40c8-90db-c8d8d67e4ef2" providerId="ADAL" clId="{9D51384A-06A3-4410-8BBF-4FD5D23211D3}" dt="2020-03-30T15:59:00.474" v="3798"/>
+        <pc:chgData name="Belinsky, Charles" userId="df390934-7dca-40c8-90db-c8d8d67e4ef2" providerId="ADAL" clId="{9D51384A-06A3-4410-8BBF-4FD5D23211D3}" dt="2020-03-30T16:56:21.978" v="3841" actId="6549"/>
         <pc:sldMkLst>
           <pc:docMk/>
           <pc:sldMk cId="3969417241" sldId="290"/>
@@ -406,7 +406,7 @@
         </pc:spChg>
       </pc:sldChg>
       <pc:sldChg chg="modSp mod modNotes modNotesTx">
-        <pc:chgData name="Belinsky, Charles" userId="df390934-7dca-40c8-90db-c8d8d67e4ef2" providerId="ADAL" clId="{9D51384A-06A3-4410-8BBF-4FD5D23211D3}" dt="2020-03-30T15:59:00.474" v="3798"/>
+        <pc:chgData name="Belinsky, Charles" userId="df390934-7dca-40c8-90db-c8d8d67e4ef2" providerId="ADAL" clId="{9D51384A-06A3-4410-8BBF-4FD5D23211D3}" dt="2020-03-30T16:55:59.139" v="3833" actId="6549"/>
         <pc:sldMkLst>
           <pc:docMk/>
           <pc:sldMk cId="1690464180" sldId="293"/>
@@ -443,8 +443,8 @@
           </ac:spMkLst>
         </pc:spChg>
       </pc:sldChg>
-      <pc:sldChg chg="modSp mod modNotes">
-        <pc:chgData name="Belinsky, Charles" userId="df390934-7dca-40c8-90db-c8d8d67e4ef2" providerId="ADAL" clId="{9D51384A-06A3-4410-8BBF-4FD5D23211D3}" dt="2020-03-30T15:59:00.474" v="3798"/>
+      <pc:sldChg chg="modSp mod modNotes modNotesTx">
+        <pc:chgData name="Belinsky, Charles" userId="df390934-7dca-40c8-90db-c8d8d67e4ef2" providerId="ADAL" clId="{9D51384A-06A3-4410-8BBF-4FD5D23211D3}" dt="2020-03-30T16:55:52.052" v="3830" actId="6549"/>
         <pc:sldMkLst>
           <pc:docMk/>
           <pc:sldMk cId="2109213187" sldId="295"/>
@@ -458,8 +458,8 @@
           </ac:spMkLst>
         </pc:spChg>
       </pc:sldChg>
-      <pc:sldChg chg="modSp mod modNotes">
-        <pc:chgData name="Belinsky, Charles" userId="df390934-7dca-40c8-90db-c8d8d67e4ef2" providerId="ADAL" clId="{9D51384A-06A3-4410-8BBF-4FD5D23211D3}" dt="2020-03-30T16:48:11.891" v="3827" actId="5793"/>
+      <pc:sldChg chg="modSp mod modNotes modNotesTx">
+        <pc:chgData name="Belinsky, Charles" userId="df390934-7dca-40c8-90db-c8d8d67e4ef2" providerId="ADAL" clId="{9D51384A-06A3-4410-8BBF-4FD5D23211D3}" dt="2020-03-30T16:55:54.402" v="3831" actId="6549"/>
         <pc:sldMkLst>
           <pc:docMk/>
           <pc:sldMk cId="139896278" sldId="297"/>
@@ -474,7 +474,7 @@
         </pc:spChg>
       </pc:sldChg>
       <pc:sldChg chg="modSp mod modNotes modNotesTx">
-        <pc:chgData name="Belinsky, Charles" userId="df390934-7dca-40c8-90db-c8d8d67e4ef2" providerId="ADAL" clId="{9D51384A-06A3-4410-8BBF-4FD5D23211D3}" dt="2020-03-30T15:59:00.474" v="3798"/>
+        <pc:chgData name="Belinsky, Charles" userId="df390934-7dca-40c8-90db-c8d8d67e4ef2" providerId="ADAL" clId="{9D51384A-06A3-4410-8BBF-4FD5D23211D3}" dt="2020-03-30T16:55:45.100" v="3828" actId="6549"/>
         <pc:sldMkLst>
           <pc:docMk/>
           <pc:sldMk cId="3336794585" sldId="299"/>
@@ -505,7 +505,7 @@
         </pc:spChg>
       </pc:sldChg>
       <pc:sldChg chg="modSp add mod modNotes modNotesTx">
-        <pc:chgData name="Belinsky, Charles" userId="df390934-7dca-40c8-90db-c8d8d67e4ef2" providerId="ADAL" clId="{9D51384A-06A3-4410-8BBF-4FD5D23211D3}" dt="2020-03-30T15:59:00.474" v="3798"/>
+        <pc:chgData name="Belinsky, Charles" userId="df390934-7dca-40c8-90db-c8d8d67e4ef2" providerId="ADAL" clId="{9D51384A-06A3-4410-8BBF-4FD5D23211D3}" dt="2020-03-30T16:55:49.691" v="3829" actId="6549"/>
         <pc:sldMkLst>
           <pc:docMk/>
           <pc:sldMk cId="3229575491" sldId="300"/>
@@ -1496,10 +1496,7 @@
           <a:bodyPr/>
           <a:lstStyle/>
           <a:p>
-            <a:r>
-              <a:rPr lang="en-US" dirty="0"/>
-              <a:t>YS document – internal script</a:t>
-            </a:r>
+            <a:endParaRPr lang="en-US" dirty="0"/>
           </a:p>
         </p:txBody>
       </p:sp>
@@ -1588,22 +1585,7 @@
           <a:bodyPr/>
           <a:lstStyle/>
           <a:p>
-            <a:r>
-              <a:rPr lang="en-US" dirty="0"/>
-              <a:t>Still bad practice…</a:t>
-            </a:r>
-          </a:p>
-          <a:p>
-            <a:r>
-              <a:rPr lang="en-US" dirty="0"/>
-              <a:t>EVAL and ECHO = FALSE: test code (commented out code)</a:t>
-            </a:r>
-          </a:p>
-          <a:p>
-            <a:r>
-              <a:rPr lang="en-US" dirty="0"/>
-              <a:t>EVAL = FALSE and ECHO = TRUE is generally only used in a tutorial</a:t>
-            </a:r>
+            <a:endParaRPr lang="en-US" dirty="0"/>
           </a:p>
         </p:txBody>
       </p:sp>
@@ -1692,22 +1674,7 @@
           <a:bodyPr/>
           <a:lstStyle/>
           <a:p>
-            <a:r>
-              <a:rPr lang="en-US" dirty="0"/>
-              <a:t>Development takes place outside of RMD – generally this is preferred</a:t>
-            </a:r>
-          </a:p>
-          <a:p>
-            <a:r>
-              <a:rPr lang="en-US" dirty="0"/>
-              <a:t>Same code as last example</a:t>
-            </a:r>
-          </a:p>
-          <a:p>
-            <a:r>
-              <a:rPr lang="en-US" dirty="0"/>
-              <a:t>RMD is calling an R script file – these two formats use different systems to figure out the working directory</a:t>
-            </a:r>
+            <a:endParaRPr lang="en-US" dirty="0"/>
           </a:p>
         </p:txBody>
       </p:sp>
@@ -1796,7 +1763,7 @@
           <a:bodyPr/>
           <a:lstStyle/>
           <a:p>
-            <a:endParaRPr lang="en-US"/>
+            <a:endParaRPr lang="en-US" dirty="0"/>
           </a:p>
         </p:txBody>
       </p:sp>
@@ -1885,32 +1852,7 @@
           <a:bodyPr/>
           <a:lstStyle/>
           <a:p>
-            <a:r>
-              <a:rPr lang="en-US" dirty="0" err="1"/>
-              <a:t>Rmd</a:t>
-            </a:r>
-            <a:r>
-              <a:rPr lang="en-US" dirty="0"/>
-              <a:t>: Use Header structure</a:t>
-            </a:r>
-          </a:p>
-          <a:p>
-            <a:r>
-              <a:rPr lang="en-US" dirty="0"/>
-              <a:t>HTML: Hyperlink Text Markup Language</a:t>
-            </a:r>
-          </a:p>
-          <a:p>
-            <a:r>
-              <a:rPr lang="en-US" dirty="0"/>
-              <a:t>LaTeX</a:t>
-            </a:r>
-          </a:p>
-          <a:p>
-            <a:r>
-              <a:rPr lang="en-US" dirty="0"/>
-              <a:t>XML: Extensible Markup Language</a:t>
-            </a:r>
+            <a:endParaRPr lang="en-US" dirty="0"/>
           </a:p>
         </p:txBody>
       </p:sp>
@@ -1999,7 +1941,7 @@
           <a:bodyPr/>
           <a:lstStyle/>
           <a:p>
-            <a:endParaRPr lang="en-US"/>
+            <a:endParaRPr lang="en-US" dirty="0"/>
           </a:p>
         </p:txBody>
       </p:sp>
@@ -2088,10 +2030,7 @@
           <a:bodyPr/>
           <a:lstStyle/>
           <a:p>
-            <a:r>
-              <a:rPr lang="en-US" dirty="0"/>
-              <a:t>Execute 01-WindAndTemps.R to see Environment</a:t>
-            </a:r>
+            <a:endParaRPr lang="en-US" dirty="0"/>
           </a:p>
         </p:txBody>
       </p:sp>
@@ -2180,14 +2119,6 @@
           <a:bodyPr/>
           <a:lstStyle/>
           <a:p>
-            <a:r>
-              <a:rPr lang="en-US" dirty="0"/>
-              <a:t>Color change to hyperlinks -- </a:t>
-            </a:r>
-            <a:r>
-              <a:rPr lang="en-US" dirty="0" err="1"/>
-              <a:t>urlcolor</a:t>
-            </a:r>
             <a:endParaRPr lang="en-US" dirty="0"/>
           </a:p>
         </p:txBody>
@@ -2373,16 +2304,7 @@
           <a:bodyPr/>
           <a:lstStyle/>
           <a:p>
-            <a:r>
-              <a:rPr lang="en-US" dirty="0"/>
-              <a:t>Could do a whole workshop on just these three things… that are taught to programmers in the first year</a:t>
-            </a:r>
-          </a:p>
-          <a:p>
-            <a:r>
-              <a:rPr lang="en-US" dirty="0"/>
-              <a:t>For this workshop, I have done my best to hack around these issues</a:t>
-            </a:r>
+            <a:endParaRPr lang="en-US" dirty="0"/>
           </a:p>
         </p:txBody>
       </p:sp>
@@ -2471,16 +2393,7 @@
           <a:bodyPr/>
           <a:lstStyle/>
           <a:p>
-            <a:r>
-              <a:rPr lang="en-US" dirty="0"/>
-              <a:t>Test chat here – send link and file (instructions for downloading and executing the GitHub repo)</a:t>
-            </a:r>
-          </a:p>
-          <a:p>
-            <a:r>
-              <a:rPr lang="en-US" dirty="0"/>
-              <a:t>Can send files through Zoom</a:t>
-            </a:r>
+            <a:endParaRPr lang="en-US" dirty="0"/>
           </a:p>
         </p:txBody>
       </p:sp>
@@ -2569,22 +2482,7 @@
           <a:bodyPr/>
           <a:lstStyle/>
           <a:p>
-            <a:r>
-              <a:rPr lang="en-US" dirty="0"/>
-              <a:t>Show 01.R</a:t>
-            </a:r>
-          </a:p>
-          <a:p>
-            <a:r>
-              <a:rPr lang="en-US" dirty="0"/>
-              <a:t>Use sourced script in example 5</a:t>
-            </a:r>
-          </a:p>
-          <a:p>
-            <a:r>
-              <a:rPr lang="en-US" dirty="0"/>
-              <a:t>RMD does allow cat() and print() but it does not look good</a:t>
-            </a:r>
+            <a:endParaRPr lang="en-US" dirty="0"/>
           </a:p>
         </p:txBody>
       </p:sp>
@@ -2673,18 +2571,6 @@
           <a:bodyPr/>
           <a:lstStyle/>
           <a:p>
-            <a:r>
-              <a:rPr lang="en-US" dirty="0"/>
-              <a:t>Just here to show you some of the complexities of Working Directories</a:t>
-            </a:r>
-          </a:p>
-          <a:p>
-            <a:r>
-              <a:rPr lang="en-US" dirty="0"/>
-              <a:t>Still does not work for you:  Uncomment the URL link (another hack…)</a:t>
-            </a:r>
-          </a:p>
-          <a:p>
             <a:endParaRPr lang="en-US" dirty="0"/>
           </a:p>
         </p:txBody>
@@ -2774,20 +2660,6 @@
           <a:bodyPr/>
           <a:lstStyle/>
           <a:p>
-            <a:r>
-              <a:rPr lang="en-US" dirty="0"/>
-              <a:t>The worse way to do this… but the easiest</a:t>
-            </a:r>
-          </a:p>
-          <a:p>
-            <a:r>
-              <a:rPr lang="en-US" dirty="0"/>
-              <a:t>Can follow along – this is a copy of the 02*.</a:t>
-            </a:r>
-            <a:r>
-              <a:rPr lang="en-US" dirty="0" err="1"/>
-              <a:t>Rmd</a:t>
-            </a:r>
             <a:endParaRPr lang="en-US" dirty="0"/>
           </a:p>
         </p:txBody>
@@ -2877,10 +2749,7 @@
           <a:bodyPr/>
           <a:lstStyle/>
           <a:p>
-            <a:r>
-              <a:rPr lang="en-US" dirty="0"/>
-              <a:t>Can also use Python instead of R</a:t>
-            </a:r>
+            <a:endParaRPr lang="en-US" dirty="0"/>
           </a:p>
         </p:txBody>
       </p:sp>
@@ -2969,16 +2838,7 @@
           <a:bodyPr/>
           <a:lstStyle/>
           <a:p>
-            <a:r>
-              <a:rPr lang="en-US" dirty="0"/>
-              <a:t>Tutorial vs reports</a:t>
-            </a:r>
-          </a:p>
-          <a:p>
-            <a:r>
-              <a:rPr lang="en-US" dirty="0"/>
-              <a:t>Can delete author and date</a:t>
-            </a:r>
+            <a:endParaRPr lang="en-US" dirty="0"/>
           </a:p>
         </p:txBody>
       </p:sp>
@@ -3067,32 +2927,6 @@
           <a:bodyPr/>
           <a:lstStyle/>
           <a:p>
-            <a:r>
-              <a:rPr lang="en-US" dirty="0"/>
-              <a:t>This workshop is geared towards a PDF document but…</a:t>
-            </a:r>
-          </a:p>
-          <a:p>
-            <a:r>
-              <a:rPr lang="en-US" dirty="0" err="1"/>
-              <a:t>Rmd</a:t>
-            </a:r>
-            <a:r>
-              <a:rPr lang="en-US" dirty="0"/>
-              <a:t> is a bridge to the other documents</a:t>
-            </a:r>
-          </a:p>
-          <a:p>
-            <a:r>
-              <a:rPr lang="en-US" dirty="0"/>
-              <a:t>Conversions: HTML </a:t>
-            </a:r>
-            <a:r>
-              <a:rPr lang="en-US" dirty="0">
-                <a:sym typeface="Wingdings" panose="05000000000000000000" pitchFamily="2" charset="2"/>
-              </a:rPr>
-              <a:t> PDF</a:t>
-            </a:r>
             <a:endParaRPr lang="en-US" dirty="0"/>
           </a:p>
         </p:txBody>
@@ -11876,6 +11710,15 @@
 </file>
 
 <file path=customXml/item1.xml><?xml version="1.0" encoding="utf-8"?>
+<?mso-contentType ?>
+<FormTemplates xmlns="http://schemas.microsoft.com/sharepoint/v3/contenttype/forms">
+  <Display>DocumentLibraryForm</Display>
+  <Edit>DocumentLibraryForm</Edit>
+  <New>DocumentLibraryForm</New>
+</FormTemplates>
+</file>
+
+<file path=customXml/item2.xml><?xml version="1.0" encoding="utf-8"?>
 <ct:contentTypeSchema xmlns:ct="http://schemas.microsoft.com/office/2006/metadata/contentType" xmlns:ma="http://schemas.microsoft.com/office/2006/metadata/properties/metaAttributes" ct:_="" ma:_="" ma:contentTypeName="Document" ma:contentTypeID="0x0101003DB5B97B54300B4889C1AC7361F68213" ma:contentTypeVersion="14" ma:contentTypeDescription="Create a new document." ma:contentTypeScope="" ma:versionID="b3a4fb828f3a04ce1ee1646d58eb04a7">
   <xsd:schema xmlns:xsd="http://www.w3.org/2001/XMLSchema" xmlns:xs="http://www.w3.org/2001/XMLSchema" xmlns:p="http://schemas.microsoft.com/office/2006/metadata/properties" xmlns:ns1="http://schemas.microsoft.com/sharepoint/v3" xmlns:ns2="0b3136f0-a1b3-4de4-aaf6-47b51dbb702c" xmlns:ns3="3076eba4-c0ca-4bad-b773-16a3112e7607" targetNamespace="http://schemas.microsoft.com/office/2006/metadata/properties" ma:root="true" ma:fieldsID="fc7abf6f59e632741c2abb53f83e984a" ns1:_="" ns2:_="" ns3:_="">
     <xsd:import namespace="http://schemas.microsoft.com/sharepoint/v3"/>
@@ -12109,15 +11952,6 @@
 </ct:contentTypeSchema>
 </file>
 
-<file path=customXml/item2.xml><?xml version="1.0" encoding="utf-8"?>
-<?mso-contentType ?>
-<FormTemplates xmlns="http://schemas.microsoft.com/sharepoint/v3/contenttype/forms">
-  <Display>DocumentLibraryForm</Display>
-  <Edit>DocumentLibraryForm</Edit>
-  <New>DocumentLibraryForm</New>
-</FormTemplates>
-</file>
-
 <file path=customXml/item3.xml><?xml version="1.0" encoding="utf-8"?>
 <p:properties xmlns:p="http://schemas.microsoft.com/office/2006/metadata/properties" xmlns:xsi="http://www.w3.org/2001/XMLSchema-instance" xmlns:pc="http://schemas.microsoft.com/office/infopath/2007/PartnerControls">
   <documentManagement>
@@ -12128,6 +11962,14 @@
 </file>
 
 <file path=customXml/itemProps1.xml><?xml version="1.0" encoding="utf-8"?>
+<ds:datastoreItem xmlns:ds="http://schemas.openxmlformats.org/officeDocument/2006/customXml" ds:itemID="{33A2B218-4FC3-469B-A2C0-BF247A0E867B}">
+  <ds:schemaRefs>
+    <ds:schemaRef ds:uri="http://schemas.microsoft.com/sharepoint/v3/contenttype/forms"/>
+  </ds:schemaRefs>
+</ds:datastoreItem>
+</file>
+
+<file path=customXml/itemProps2.xml><?xml version="1.0" encoding="utf-8"?>
 <ds:datastoreItem xmlns:ds="http://schemas.openxmlformats.org/officeDocument/2006/customXml" ds:itemID="{F7CFC312-B933-4005-9ADA-34F165F7358A}">
   <ds:schemaRefs>
     <ds:schemaRef ds:uri="http://schemas.microsoft.com/office/2006/metadata/contentType"/>
@@ -12147,28 +11989,12 @@
 </ds:datastoreItem>
 </file>
 
-<file path=customXml/itemProps2.xml><?xml version="1.0" encoding="utf-8"?>
-<ds:datastoreItem xmlns:ds="http://schemas.openxmlformats.org/officeDocument/2006/customXml" ds:itemID="{33A2B218-4FC3-469B-A2C0-BF247A0E867B}">
-  <ds:schemaRefs>
-    <ds:schemaRef ds:uri="http://schemas.microsoft.com/sharepoint/v3/contenttype/forms"/>
-  </ds:schemaRefs>
-</ds:datastoreItem>
-</file>
-
 <file path=customXml/itemProps3.xml><?xml version="1.0" encoding="utf-8"?>
 <ds:datastoreItem xmlns:ds="http://schemas.openxmlformats.org/officeDocument/2006/customXml" ds:itemID="{60C67BEE-D13F-4BD2-98A5-34D8A0977F68}">
   <ds:schemaRefs>
-    <ds:schemaRef ds:uri="http://schemas.openxmlformats.org/package/2006/metadata/core-properties"/>
+    <ds:schemaRef ds:uri="http://schemas.microsoft.com/office/2006/metadata/properties"/>
     <ds:schemaRef ds:uri="http://schemas.microsoft.com/office/infopath/2007/PartnerControls"/>
-    <ds:schemaRef ds:uri="http://schemas.microsoft.com/office/2006/metadata/properties"/>
-    <ds:schemaRef ds:uri="http://schemas.microsoft.com/office/2006/documentManagement/types"/>
-    <ds:schemaRef ds:uri="0b3136f0-a1b3-4de4-aaf6-47b51dbb702c"/>
-    <ds:schemaRef ds:uri="http://purl.org/dc/terms/"/>
-    <ds:schemaRef ds:uri="http://purl.org/dc/elements/1.1/"/>
-    <ds:schemaRef ds:uri="http://www.w3.org/XML/1998/namespace"/>
-    <ds:schemaRef ds:uri="3076eba4-c0ca-4bad-b773-16a3112e7607"/>
     <ds:schemaRef ds:uri="http://schemas.microsoft.com/sharepoint/v3"/>
-    <ds:schemaRef ds:uri="http://purl.org/dc/dcmitype/"/>
   </ds:schemaRefs>
 </ds:datastoreItem>
 </file>
</xml_diff>